<commit_message>
Added project management information to pp
</commit_message>
<xml_diff>
--- a/Presentaties/Iteration1.pptx
+++ b/Presentaties/Iteration1.pptx
@@ -19,22 +19,26 @@
     <p:sldId id="258" r:id="rId13"/>
     <p:sldId id="265" r:id="rId14"/>
     <p:sldId id="269" r:id="rId15"/>
-    <p:sldId id="270" r:id="rId16"/>
-    <p:sldId id="271" r:id="rId17"/>
-    <p:sldId id="272" r:id="rId18"/>
-    <p:sldId id="273" r:id="rId19"/>
-    <p:sldId id="274" r:id="rId20"/>
-    <p:sldId id="275" r:id="rId21"/>
-    <p:sldId id="276" r:id="rId22"/>
-    <p:sldId id="277" r:id="rId23"/>
-    <p:sldId id="281" r:id="rId24"/>
-    <p:sldId id="278" r:id="rId25"/>
-    <p:sldId id="279" r:id="rId26"/>
-    <p:sldId id="280" r:id="rId27"/>
-    <p:sldId id="282" r:id="rId28"/>
-    <p:sldId id="283" r:id="rId29"/>
-    <p:sldId id="284" r:id="rId30"/>
-    <p:sldId id="285" r:id="rId31"/>
+    <p:sldId id="286" r:id="rId16"/>
+    <p:sldId id="287" r:id="rId17"/>
+    <p:sldId id="288" r:id="rId18"/>
+    <p:sldId id="289" r:id="rId19"/>
+    <p:sldId id="270" r:id="rId20"/>
+    <p:sldId id="271" r:id="rId21"/>
+    <p:sldId id="272" r:id="rId22"/>
+    <p:sldId id="273" r:id="rId23"/>
+    <p:sldId id="274" r:id="rId24"/>
+    <p:sldId id="275" r:id="rId25"/>
+    <p:sldId id="276" r:id="rId26"/>
+    <p:sldId id="277" r:id="rId27"/>
+    <p:sldId id="281" r:id="rId28"/>
+    <p:sldId id="278" r:id="rId29"/>
+    <p:sldId id="279" r:id="rId30"/>
+    <p:sldId id="280" r:id="rId31"/>
+    <p:sldId id="282" r:id="rId32"/>
+    <p:sldId id="283" r:id="rId33"/>
+    <p:sldId id="284" r:id="rId34"/>
+    <p:sldId id="285" r:id="rId35"/>
   </p:sldIdLst>
   <p:sldSz cx="12192000" cy="6858000"/>
   <p:notesSz cx="6858000" cy="9144000"/>
@@ -152,6 +156,10 @@
             <p14:sldId id="258"/>
             <p14:sldId id="265"/>
             <p14:sldId id="269"/>
+            <p14:sldId id="286"/>
+            <p14:sldId id="287"/>
+            <p14:sldId id="288"/>
+            <p14:sldId id="289"/>
             <p14:sldId id="270"/>
             <p14:sldId id="271"/>
             <p14:sldId id="272"/>
@@ -182,7 +190,7 @@
 <file path=ppt/charts/chart1.xml><?xml version="1.0" encoding="utf-8"?>
 <c:chartSpace xmlns:c="http://schemas.openxmlformats.org/drawingml/2006/chart" xmlns:a="http://schemas.openxmlformats.org/drawingml/2006/main" xmlns:r="http://schemas.openxmlformats.org/officeDocument/2006/relationships" xmlns:c16r2="http://schemas.microsoft.com/office/drawing/2015/06/chart">
   <c:date1904 val="0"/>
-  <c:lang val="en-US"/>
+  <c:lang val="nl-NL"/>
   <c:roundedCorners val="0"/>
   <mc:AlternateContent xmlns:mc="http://schemas.openxmlformats.org/markup-compatibility/2006">
     <mc:Choice xmlns:c14="http://schemas.microsoft.com/office/drawing/2007/8/2/chart" Requires="c14">
@@ -499,7 +507,7 @@
                     <a:cs typeface="+mn-cs"/>
                   </a:defRPr>
                 </a:pPr>
-                <a:endParaRPr lang="en-US"/>
+                <a:endParaRPr lang="nl-BE"/>
               </a:p>
             </c:txPr>
             <c:dLblPos val="bestFit"/>
@@ -617,6 +625,7 @@
     </c:plotArea>
     <c:plotVisOnly val="1"/>
     <c:dispBlanksAs val="gap"/>
+    <c:showDLblsOverMax val="0"/>
     <c:extLst>
       <c:ext xmlns:c16r3="http://schemas.microsoft.com/office/drawing/2017/03/chart" uri="{56B9EC1D-385E-4148-901F-78D8002777C0}">
         <c16r3:dataDisplayOptions16>
@@ -624,7 +633,6 @@
         </c16r3:dataDisplayOptions16>
       </c:ext>
     </c:extLst>
-    <c:showDLblsOverMax val="0"/>
   </c:chart>
   <c:spPr>
     <a:noFill/>
@@ -640,7 +648,7 @@
       <a:pPr>
         <a:defRPr/>
       </a:pPr>
-      <a:endParaRPr lang="en-US"/>
+      <a:endParaRPr lang="nl-BE"/>
     </a:p>
   </c:txPr>
   <c:externalData r:id="rId3">
@@ -652,7 +660,7 @@
 <file path=ppt/charts/chart2.xml><?xml version="1.0" encoding="utf-8"?>
 <c:chartSpace xmlns:c="http://schemas.openxmlformats.org/drawingml/2006/chart" xmlns:a="http://schemas.openxmlformats.org/drawingml/2006/main" xmlns:r="http://schemas.openxmlformats.org/officeDocument/2006/relationships" xmlns:c16r2="http://schemas.microsoft.com/office/drawing/2015/06/chart">
   <c:date1904 val="0"/>
-  <c:lang val="en-US"/>
+  <c:lang val="nl-NL"/>
   <c:roundedCorners val="0"/>
   <mc:AlternateContent xmlns:mc="http://schemas.openxmlformats.org/markup-compatibility/2006">
     <mc:Choice xmlns:c14="http://schemas.microsoft.com/office/drawing/2007/8/2/chart" Requires="c14">
@@ -940,7 +948,7 @@
                     <a:cs typeface="+mn-cs"/>
                   </a:defRPr>
                 </a:pPr>
-                <a:endParaRPr lang="en-US"/>
+                <a:endParaRPr lang="nl-BE"/>
               </a:p>
             </c:txPr>
             <c:dLblPos val="bestFit"/>
@@ -1058,6 +1066,7 @@
     </c:plotArea>
     <c:plotVisOnly val="1"/>
     <c:dispBlanksAs val="gap"/>
+    <c:showDLblsOverMax val="0"/>
     <c:extLst>
       <c:ext xmlns:c16r3="http://schemas.microsoft.com/office/drawing/2017/03/chart" uri="{56B9EC1D-385E-4148-901F-78D8002777C0}">
         <c16r3:dataDisplayOptions16>
@@ -1065,7 +1074,6 @@
         </c16r3:dataDisplayOptions16>
       </c:ext>
     </c:extLst>
-    <c:showDLblsOverMax val="0"/>
   </c:chart>
   <c:spPr>
     <a:noFill/>
@@ -1081,7 +1089,7 @@
       <a:pPr>
         <a:defRPr/>
       </a:pPr>
-      <a:endParaRPr lang="en-US"/>
+      <a:endParaRPr lang="nl-BE"/>
     </a:p>
   </c:txPr>
   <c:externalData r:id="rId3">
@@ -2534,7 +2542,7 @@
           <a:p>
             <a:fld id="{ABBCC5BB-7559-4F86-B19F-0508DBA45658}" type="slidenum">
               <a:rPr lang="en-US" smtClean="0"/>
-              <a:t>‹#›</a:t>
+              <a:t>‹nr.›</a:t>
             </a:fld>
             <a:endParaRPr lang="en-US"/>
           </a:p>
@@ -2742,7 +2750,7 @@
           <a:p>
             <a:fld id="{ABBCC5BB-7559-4F86-B19F-0508DBA45658}" type="slidenum">
               <a:rPr lang="en-US" smtClean="0"/>
-              <a:t>‹#›</a:t>
+              <a:t>‹nr.›</a:t>
             </a:fld>
             <a:endParaRPr lang="en-US"/>
           </a:p>
@@ -2998,7 +3006,7 @@
           <a:p>
             <a:fld id="{ABBCC5BB-7559-4F86-B19F-0508DBA45658}" type="slidenum">
               <a:rPr lang="en-US" smtClean="0"/>
-              <a:t>‹#›</a:t>
+              <a:t>‹nr.›</a:t>
             </a:fld>
             <a:endParaRPr lang="en-US"/>
           </a:p>
@@ -3172,7 +3180,7 @@
           <a:p>
             <a:fld id="{ABBCC5BB-7559-4F86-B19F-0508DBA45658}" type="slidenum">
               <a:rPr lang="en-US" smtClean="0"/>
-              <a:t>‹#›</a:t>
+              <a:t>‹nr.›</a:t>
             </a:fld>
             <a:endParaRPr lang="en-US"/>
           </a:p>
@@ -3515,7 +3523,7 @@
           <a:p>
             <a:fld id="{ABBCC5BB-7559-4F86-B19F-0508DBA45658}" type="slidenum">
               <a:rPr lang="en-US" smtClean="0"/>
-              <a:t>‹#›</a:t>
+              <a:t>‹nr.›</a:t>
             </a:fld>
             <a:endParaRPr lang="en-US"/>
           </a:p>
@@ -3790,7 +3798,7 @@
           <a:p>
             <a:fld id="{ABBCC5BB-7559-4F86-B19F-0508DBA45658}" type="slidenum">
               <a:rPr lang="en-US" smtClean="0"/>
-              <a:t>‹#›</a:t>
+              <a:t>‹nr.›</a:t>
             </a:fld>
             <a:endParaRPr lang="en-US"/>
           </a:p>
@@ -4169,7 +4177,7 @@
           <a:p>
             <a:fld id="{ABBCC5BB-7559-4F86-B19F-0508DBA45658}" type="slidenum">
               <a:rPr lang="en-US" smtClean="0"/>
-              <a:t>‹#›</a:t>
+              <a:t>‹nr.›</a:t>
             </a:fld>
             <a:endParaRPr lang="en-US"/>
           </a:p>
@@ -4287,7 +4295,7 @@
           <a:p>
             <a:fld id="{ABBCC5BB-7559-4F86-B19F-0508DBA45658}" type="slidenum">
               <a:rPr lang="en-US" smtClean="0"/>
-              <a:t>‹#›</a:t>
+              <a:t>‹nr.›</a:t>
             </a:fld>
             <a:endParaRPr lang="en-US"/>
           </a:p>
@@ -4466,7 +4474,7 @@
           <a:p>
             <a:fld id="{ABBCC5BB-7559-4F86-B19F-0508DBA45658}" type="slidenum">
               <a:rPr lang="en-US" smtClean="0"/>
-              <a:t>‹#›</a:t>
+              <a:t>‹nr.›</a:t>
             </a:fld>
             <a:endParaRPr lang="en-US"/>
           </a:p>
@@ -4833,7 +4841,7 @@
           <a:p>
             <a:fld id="{ABBCC5BB-7559-4F86-B19F-0508DBA45658}" type="slidenum">
               <a:rPr lang="en-US" smtClean="0"/>
-              <a:t>‹#›</a:t>
+              <a:t>‹nr.›</a:t>
             </a:fld>
             <a:endParaRPr lang="en-US"/>
           </a:p>
@@ -5194,7 +5202,7 @@
           <a:p>
             <a:fld id="{ABBCC5BB-7559-4F86-B19F-0508DBA45658}" type="slidenum">
               <a:rPr lang="en-US" smtClean="0"/>
-              <a:t>‹#›</a:t>
+              <a:t>‹nr.›</a:t>
             </a:fld>
             <a:endParaRPr lang="en-US"/>
           </a:p>
@@ -5513,7 +5521,7 @@
           <a:p>
             <a:fld id="{ABBCC5BB-7559-4F86-B19F-0508DBA45658}" type="slidenum">
               <a:rPr lang="en-US" smtClean="0"/>
-              <a:t>‹#›</a:t>
+              <a:t>‹nr.›</a:t>
             </a:fld>
             <a:endParaRPr lang="en-US"/>
           </a:p>
@@ -6782,6 +6790,657 @@
       </p:grpSpPr>
       <p:sp>
         <p:nvSpPr>
+          <p:cNvPr id="2" name="Titel 1"/>
+          <p:cNvSpPr>
+            <a:spLocks noGrp="1"/>
+          </p:cNvSpPr>
+          <p:nvPr>
+            <p:ph type="title"/>
+          </p:nvPr>
+        </p:nvSpPr>
+        <p:spPr/>
+        <p:txBody>
+          <a:bodyPr/>
+          <a:lstStyle/>
+          <a:p>
+            <a:r>
+              <a:rPr lang="nl-BE" dirty="0" err="1"/>
+              <a:t>Overview</a:t>
+            </a:r>
+            <a:r>
+              <a:rPr lang="nl-BE" dirty="0"/>
+              <a:t> of project management</a:t>
+            </a:r>
+          </a:p>
+        </p:txBody>
+      </p:sp>
+      <p:sp>
+        <p:nvSpPr>
+          <p:cNvPr id="3" name="Tijdelijke aanduiding voor inhoud 2"/>
+          <p:cNvSpPr>
+            <a:spLocks noGrp="1"/>
+          </p:cNvSpPr>
+          <p:nvPr>
+            <p:ph idx="1"/>
+          </p:nvPr>
+        </p:nvSpPr>
+        <p:spPr/>
+        <p:txBody>
+          <a:bodyPr/>
+          <a:lstStyle/>
+          <a:p>
+            <a:r>
+              <a:rPr lang="nl-BE" dirty="0"/>
+              <a:t>Domain </a:t>
+            </a:r>
+            <a:r>
+              <a:rPr lang="nl-BE" dirty="0" err="1"/>
+              <a:t>Coordinator</a:t>
+            </a:r>
+            <a:r>
+              <a:rPr lang="nl-BE" dirty="0"/>
+              <a:t>: </a:t>
+            </a:r>
+            <a:r>
+              <a:rPr lang="nl-BE" dirty="0" err="1"/>
+              <a:t>Ignace</a:t>
+            </a:r>
+            <a:endParaRPr lang="nl-BE" dirty="0"/>
+          </a:p>
+          <a:p>
+            <a:r>
+              <a:rPr lang="nl-BE" dirty="0" err="1"/>
+              <a:t>Testing</a:t>
+            </a:r>
+            <a:r>
+              <a:rPr lang="nl-BE" dirty="0"/>
+              <a:t> </a:t>
+            </a:r>
+            <a:r>
+              <a:rPr lang="nl-BE" dirty="0" err="1"/>
+              <a:t>Coordinator</a:t>
+            </a:r>
+            <a:r>
+              <a:rPr lang="nl-BE" dirty="0"/>
+              <a:t>: Tom</a:t>
+            </a:r>
+          </a:p>
+          <a:p>
+            <a:r>
+              <a:rPr lang="nl-BE" dirty="0"/>
+              <a:t>Design </a:t>
+            </a:r>
+            <a:r>
+              <a:rPr lang="nl-BE" dirty="0" err="1"/>
+              <a:t>Coordinator</a:t>
+            </a:r>
+            <a:r>
+              <a:rPr lang="nl-BE" dirty="0"/>
+              <a:t>: Quinten &amp; Martijn</a:t>
+            </a:r>
+          </a:p>
+          <a:p>
+            <a:endParaRPr lang="nl-BE" dirty="0"/>
+          </a:p>
+          <a:p>
+            <a:r>
+              <a:rPr lang="nl-BE" dirty="0"/>
+              <a:t>Next iteration: </a:t>
+            </a:r>
+          </a:p>
+          <a:p>
+            <a:r>
+              <a:rPr lang="nl-BE" dirty="0"/>
+              <a:t>Domain </a:t>
+            </a:r>
+            <a:r>
+              <a:rPr lang="nl-BE" dirty="0" err="1"/>
+              <a:t>Coordinator</a:t>
+            </a:r>
+            <a:r>
+              <a:rPr lang="nl-BE" dirty="0"/>
+              <a:t>: Martijn</a:t>
+            </a:r>
+          </a:p>
+          <a:p>
+            <a:r>
+              <a:rPr lang="nl-BE" dirty="0" err="1"/>
+              <a:t>Testing</a:t>
+            </a:r>
+            <a:r>
+              <a:rPr lang="nl-BE" dirty="0"/>
+              <a:t> </a:t>
+            </a:r>
+            <a:r>
+              <a:rPr lang="nl-BE" dirty="0" err="1"/>
+              <a:t>Coordinator</a:t>
+            </a:r>
+            <a:r>
+              <a:rPr lang="nl-BE" dirty="0"/>
+              <a:t>: </a:t>
+            </a:r>
+            <a:r>
+              <a:rPr lang="nl-BE" dirty="0" err="1"/>
+              <a:t>Ignace</a:t>
+            </a:r>
+            <a:endParaRPr lang="nl-BE" dirty="0"/>
+          </a:p>
+          <a:p>
+            <a:r>
+              <a:rPr lang="nl-BE" dirty="0"/>
+              <a:t>Design </a:t>
+            </a:r>
+            <a:r>
+              <a:rPr lang="nl-BE" dirty="0" err="1"/>
+              <a:t>Coordinator</a:t>
+            </a:r>
+            <a:r>
+              <a:rPr lang="nl-BE" dirty="0"/>
+              <a:t>: Tom &amp; Quinten </a:t>
+            </a:r>
+          </a:p>
+          <a:p>
+            <a:pPr marL="0" indent="0">
+              <a:buNone/>
+            </a:pPr>
+            <a:endParaRPr lang="nl-BE" dirty="0"/>
+          </a:p>
+        </p:txBody>
+      </p:sp>
+    </p:spTree>
+    <p:extLst>
+      <p:ext uri="{BB962C8B-B14F-4D97-AF65-F5344CB8AC3E}">
+        <p14:creationId xmlns:p14="http://schemas.microsoft.com/office/powerpoint/2010/main" val="3368649563"/>
+      </p:ext>
+    </p:extLst>
+  </p:cSld>
+  <p:clrMapOvr>
+    <a:masterClrMapping/>
+  </p:clrMapOvr>
+</p:sld>
+</file>
+
+<file path=ppt/slides/slide16.xml><?xml version="1.0" encoding="utf-8"?>
+<p:sld xmlns:a="http://schemas.openxmlformats.org/drawingml/2006/main" xmlns:r="http://schemas.openxmlformats.org/officeDocument/2006/relationships" xmlns:p="http://schemas.openxmlformats.org/presentationml/2006/main">
+  <p:cSld>
+    <p:spTree>
+      <p:nvGrpSpPr>
+        <p:cNvPr id="1" name=""/>
+        <p:cNvGrpSpPr/>
+        <p:nvPr/>
+      </p:nvGrpSpPr>
+      <p:grpSpPr>
+        <a:xfrm>
+          <a:off x="0" y="0"/>
+          <a:ext cx="0" cy="0"/>
+          <a:chOff x="0" y="0"/>
+          <a:chExt cx="0" cy="0"/>
+        </a:xfrm>
+      </p:grpSpPr>
+      <p:sp>
+        <p:nvSpPr>
+          <p:cNvPr id="2" name="Titel 1"/>
+          <p:cNvSpPr>
+            <a:spLocks noGrp="1"/>
+          </p:cNvSpPr>
+          <p:nvPr>
+            <p:ph type="title"/>
+          </p:nvPr>
+        </p:nvSpPr>
+        <p:spPr/>
+        <p:txBody>
+          <a:bodyPr/>
+          <a:lstStyle/>
+          <a:p>
+            <a:r>
+              <a:rPr lang="nl-BE" dirty="0" err="1"/>
+              <a:t>Spent</a:t>
+            </a:r>
+            <a:r>
+              <a:rPr lang="nl-BE" dirty="0"/>
+              <a:t> </a:t>
+            </a:r>
+            <a:r>
+              <a:rPr lang="nl-BE" dirty="0" err="1"/>
+              <a:t>hours</a:t>
+            </a:r>
+            <a:r>
+              <a:rPr lang="nl-BE" dirty="0"/>
+              <a:t>: Group </a:t>
+            </a:r>
+            <a:r>
+              <a:rPr lang="nl-BE" dirty="0" err="1"/>
+              <a:t>work</a:t>
+            </a:r>
+            <a:endParaRPr lang="nl-BE" dirty="0"/>
+          </a:p>
+        </p:txBody>
+      </p:sp>
+      <p:sp>
+        <p:nvSpPr>
+          <p:cNvPr id="3" name="Tijdelijke aanduiding voor inhoud 2"/>
+          <p:cNvSpPr>
+            <a:spLocks noGrp="1"/>
+          </p:cNvSpPr>
+          <p:nvPr>
+            <p:ph idx="1"/>
+          </p:nvPr>
+        </p:nvSpPr>
+        <p:spPr/>
+        <p:txBody>
+          <a:bodyPr/>
+          <a:lstStyle/>
+          <a:p>
+            <a:r>
+              <a:rPr lang="nl-BE" dirty="0"/>
+              <a:t>Quinten </a:t>
+            </a:r>
+            <a:r>
+              <a:rPr lang="nl-BE" dirty="0" err="1"/>
+              <a:t>Bruynseeraede</a:t>
+            </a:r>
+            <a:r>
+              <a:rPr lang="nl-BE" dirty="0"/>
+              <a:t>: ~ 35 </a:t>
+            </a:r>
+            <a:r>
+              <a:rPr lang="nl-BE" dirty="0" err="1"/>
+              <a:t>hours</a:t>
+            </a:r>
+            <a:endParaRPr lang="nl-BE" dirty="0"/>
+          </a:p>
+          <a:p>
+            <a:r>
+              <a:rPr lang="nl-BE" dirty="0" err="1"/>
+              <a:t>Ignace</a:t>
+            </a:r>
+            <a:r>
+              <a:rPr lang="nl-BE" dirty="0"/>
+              <a:t> </a:t>
+            </a:r>
+            <a:r>
+              <a:rPr lang="nl-BE" dirty="0" err="1"/>
+              <a:t>Bleukx</a:t>
+            </a:r>
+            <a:r>
+              <a:rPr lang="nl-BE" dirty="0"/>
+              <a:t>: ~ 35 </a:t>
+            </a:r>
+            <a:r>
+              <a:rPr lang="nl-BE" dirty="0" err="1"/>
+              <a:t>hours</a:t>
+            </a:r>
+            <a:r>
+              <a:rPr lang="nl-BE" dirty="0"/>
+              <a:t> </a:t>
+            </a:r>
+          </a:p>
+          <a:p>
+            <a:r>
+              <a:rPr lang="nl-BE" dirty="0"/>
+              <a:t>Tom De Backer: ~ 30 </a:t>
+            </a:r>
+            <a:r>
+              <a:rPr lang="nl-BE" dirty="0" err="1"/>
+              <a:t>hours</a:t>
+            </a:r>
+            <a:endParaRPr lang="nl-BE" dirty="0"/>
+          </a:p>
+          <a:p>
+            <a:r>
+              <a:rPr lang="nl-BE" dirty="0"/>
+              <a:t>Martijn </a:t>
+            </a:r>
+            <a:r>
+              <a:rPr lang="nl-BE" dirty="0" err="1"/>
+              <a:t>Slaets</a:t>
+            </a:r>
+            <a:r>
+              <a:rPr lang="nl-BE" dirty="0"/>
+              <a:t>: ~ 20 </a:t>
+            </a:r>
+            <a:r>
+              <a:rPr lang="nl-BE" dirty="0" err="1"/>
+              <a:t>hours</a:t>
+            </a:r>
+            <a:endParaRPr lang="nl-BE" dirty="0"/>
+          </a:p>
+          <a:p>
+            <a:endParaRPr lang="nl-BE" dirty="0"/>
+          </a:p>
+        </p:txBody>
+      </p:sp>
+    </p:spTree>
+    <p:extLst>
+      <p:ext uri="{BB962C8B-B14F-4D97-AF65-F5344CB8AC3E}">
+        <p14:creationId xmlns:p14="http://schemas.microsoft.com/office/powerpoint/2010/main" val="1229639849"/>
+      </p:ext>
+    </p:extLst>
+  </p:cSld>
+  <p:clrMapOvr>
+    <a:masterClrMapping/>
+  </p:clrMapOvr>
+</p:sld>
+</file>
+
+<file path=ppt/slides/slide17.xml><?xml version="1.0" encoding="utf-8"?>
+<p:sld xmlns:a="http://schemas.openxmlformats.org/drawingml/2006/main" xmlns:r="http://schemas.openxmlformats.org/officeDocument/2006/relationships" xmlns:p="http://schemas.openxmlformats.org/presentationml/2006/main">
+  <p:cSld>
+    <p:spTree>
+      <p:nvGrpSpPr>
+        <p:cNvPr id="1" name=""/>
+        <p:cNvGrpSpPr/>
+        <p:nvPr/>
+      </p:nvGrpSpPr>
+      <p:grpSpPr>
+        <a:xfrm>
+          <a:off x="0" y="0"/>
+          <a:ext cx="0" cy="0"/>
+          <a:chOff x="0" y="0"/>
+          <a:chExt cx="0" cy="0"/>
+        </a:xfrm>
+      </p:grpSpPr>
+      <p:sp>
+        <p:nvSpPr>
+          <p:cNvPr id="2" name="Titel 1"/>
+          <p:cNvSpPr>
+            <a:spLocks noGrp="1"/>
+          </p:cNvSpPr>
+          <p:nvPr>
+            <p:ph type="title"/>
+          </p:nvPr>
+        </p:nvSpPr>
+        <p:spPr/>
+        <p:txBody>
+          <a:bodyPr/>
+          <a:lstStyle/>
+          <a:p>
+            <a:r>
+              <a:rPr lang="nl-BE" dirty="0" err="1"/>
+              <a:t>Individual</a:t>
+            </a:r>
+            <a:r>
+              <a:rPr lang="nl-BE" dirty="0"/>
+              <a:t> </a:t>
+            </a:r>
+            <a:r>
+              <a:rPr lang="nl-BE" dirty="0" err="1"/>
+              <a:t>work</a:t>
+            </a:r>
+            <a:endParaRPr lang="nl-BE" dirty="0"/>
+          </a:p>
+        </p:txBody>
+      </p:sp>
+      <p:sp>
+        <p:nvSpPr>
+          <p:cNvPr id="3" name="Tijdelijke aanduiding voor inhoud 2"/>
+          <p:cNvSpPr>
+            <a:spLocks noGrp="1"/>
+          </p:cNvSpPr>
+          <p:nvPr>
+            <p:ph idx="1"/>
+          </p:nvPr>
+        </p:nvSpPr>
+        <p:spPr/>
+        <p:txBody>
+          <a:bodyPr/>
+          <a:lstStyle/>
+          <a:p>
+            <a:r>
+              <a:rPr lang="nl-BE" dirty="0"/>
+              <a:t>Quinten </a:t>
+            </a:r>
+            <a:r>
+              <a:rPr lang="nl-BE" dirty="0" err="1"/>
+              <a:t>Bruynseeraede</a:t>
+            </a:r>
+            <a:r>
+              <a:rPr lang="nl-BE" dirty="0"/>
+              <a:t>: ~ 19 </a:t>
+            </a:r>
+            <a:r>
+              <a:rPr lang="nl-BE" dirty="0" err="1"/>
+              <a:t>hours</a:t>
+            </a:r>
+            <a:endParaRPr lang="nl-BE" dirty="0"/>
+          </a:p>
+          <a:p>
+            <a:r>
+              <a:rPr lang="nl-BE" dirty="0" err="1"/>
+              <a:t>Ignace</a:t>
+            </a:r>
+            <a:r>
+              <a:rPr lang="nl-BE" dirty="0"/>
+              <a:t> </a:t>
+            </a:r>
+            <a:r>
+              <a:rPr lang="nl-BE" dirty="0" err="1"/>
+              <a:t>Bleukx</a:t>
+            </a:r>
+            <a:r>
+              <a:rPr lang="nl-BE" dirty="0"/>
+              <a:t>: ~ 19 </a:t>
+            </a:r>
+            <a:r>
+              <a:rPr lang="nl-BE" dirty="0" err="1"/>
+              <a:t>hours</a:t>
+            </a:r>
+            <a:r>
+              <a:rPr lang="nl-BE" dirty="0"/>
+              <a:t> </a:t>
+            </a:r>
+          </a:p>
+          <a:p>
+            <a:r>
+              <a:rPr lang="nl-BE" dirty="0"/>
+              <a:t>Tom De Backer: ~ 9 </a:t>
+            </a:r>
+            <a:r>
+              <a:rPr lang="nl-BE" dirty="0" err="1"/>
+              <a:t>hours</a:t>
+            </a:r>
+            <a:endParaRPr lang="nl-BE" dirty="0"/>
+          </a:p>
+          <a:p>
+            <a:r>
+              <a:rPr lang="nl-BE" dirty="0"/>
+              <a:t>Martijn </a:t>
+            </a:r>
+            <a:r>
+              <a:rPr lang="nl-BE" dirty="0" err="1"/>
+              <a:t>Slaets</a:t>
+            </a:r>
+            <a:r>
+              <a:rPr lang="nl-BE" dirty="0"/>
+              <a:t>: ~ 9 </a:t>
+            </a:r>
+            <a:r>
+              <a:rPr lang="nl-BE" dirty="0" err="1"/>
+              <a:t>hours</a:t>
+            </a:r>
+            <a:endParaRPr lang="nl-BE" dirty="0"/>
+          </a:p>
+          <a:p>
+            <a:endParaRPr lang="nl-BE" dirty="0"/>
+          </a:p>
+        </p:txBody>
+      </p:sp>
+    </p:spTree>
+    <p:extLst>
+      <p:ext uri="{BB962C8B-B14F-4D97-AF65-F5344CB8AC3E}">
+        <p14:creationId xmlns:p14="http://schemas.microsoft.com/office/powerpoint/2010/main" val="3056279545"/>
+      </p:ext>
+    </p:extLst>
+  </p:cSld>
+  <p:clrMapOvr>
+    <a:masterClrMapping/>
+  </p:clrMapOvr>
+</p:sld>
+</file>
+
+<file path=ppt/slides/slide18.xml><?xml version="1.0" encoding="utf-8"?>
+<p:sld xmlns:a="http://schemas.openxmlformats.org/drawingml/2006/main" xmlns:r="http://schemas.openxmlformats.org/officeDocument/2006/relationships" xmlns:p="http://schemas.openxmlformats.org/presentationml/2006/main">
+  <p:cSld>
+    <p:spTree>
+      <p:nvGrpSpPr>
+        <p:cNvPr id="1" name=""/>
+        <p:cNvGrpSpPr/>
+        <p:nvPr/>
+      </p:nvGrpSpPr>
+      <p:grpSpPr>
+        <a:xfrm>
+          <a:off x="0" y="0"/>
+          <a:ext cx="0" cy="0"/>
+          <a:chOff x="0" y="0"/>
+          <a:chExt cx="0" cy="0"/>
+        </a:xfrm>
+      </p:grpSpPr>
+      <p:sp>
+        <p:nvSpPr>
+          <p:cNvPr id="2" name="Titel 1"/>
+          <p:cNvSpPr>
+            <a:spLocks noGrp="1"/>
+          </p:cNvSpPr>
+          <p:nvPr>
+            <p:ph type="title"/>
+          </p:nvPr>
+        </p:nvSpPr>
+        <p:spPr/>
+        <p:txBody>
+          <a:bodyPr/>
+          <a:lstStyle/>
+          <a:p>
+            <a:r>
+              <a:rPr lang="nl-BE" dirty="0" err="1"/>
+              <a:t>Study</a:t>
+            </a:r>
+            <a:endParaRPr lang="nl-BE" dirty="0"/>
+          </a:p>
+        </p:txBody>
+      </p:sp>
+      <p:sp>
+        <p:nvSpPr>
+          <p:cNvPr id="3" name="Tijdelijke aanduiding voor inhoud 2"/>
+          <p:cNvSpPr>
+            <a:spLocks noGrp="1"/>
+          </p:cNvSpPr>
+          <p:nvPr>
+            <p:ph idx="1"/>
+          </p:nvPr>
+        </p:nvSpPr>
+        <p:spPr/>
+        <p:txBody>
+          <a:bodyPr/>
+          <a:lstStyle/>
+          <a:p>
+            <a:r>
+              <a:rPr lang="nl-BE" dirty="0"/>
+              <a:t>Quinten </a:t>
+            </a:r>
+            <a:r>
+              <a:rPr lang="nl-BE" dirty="0" err="1"/>
+              <a:t>Bruynseeraede</a:t>
+            </a:r>
+            <a:r>
+              <a:rPr lang="nl-BE" dirty="0"/>
+              <a:t>: ~ 1 </a:t>
+            </a:r>
+            <a:r>
+              <a:rPr lang="nl-BE" dirty="0" err="1"/>
+              <a:t>hour</a:t>
+            </a:r>
+            <a:endParaRPr lang="nl-BE" dirty="0"/>
+          </a:p>
+          <a:p>
+            <a:r>
+              <a:rPr lang="nl-BE" dirty="0" err="1"/>
+              <a:t>Ignace</a:t>
+            </a:r>
+            <a:r>
+              <a:rPr lang="nl-BE" dirty="0"/>
+              <a:t> </a:t>
+            </a:r>
+            <a:r>
+              <a:rPr lang="nl-BE" dirty="0" err="1"/>
+              <a:t>Bleukx</a:t>
+            </a:r>
+            <a:r>
+              <a:rPr lang="nl-BE" dirty="0"/>
+              <a:t>: ~ 1 </a:t>
+            </a:r>
+            <a:r>
+              <a:rPr lang="nl-BE" dirty="0" err="1"/>
+              <a:t>hour</a:t>
+            </a:r>
+            <a:endParaRPr lang="nl-BE" dirty="0"/>
+          </a:p>
+          <a:p>
+            <a:r>
+              <a:rPr lang="nl-BE" dirty="0"/>
+              <a:t>Tom De Backer: ~ 1 </a:t>
+            </a:r>
+            <a:r>
+              <a:rPr lang="nl-BE" dirty="0" err="1"/>
+              <a:t>hour</a:t>
+            </a:r>
+            <a:endParaRPr lang="nl-BE" dirty="0"/>
+          </a:p>
+          <a:p>
+            <a:r>
+              <a:rPr lang="nl-BE" dirty="0"/>
+              <a:t>Martijn </a:t>
+            </a:r>
+            <a:r>
+              <a:rPr lang="nl-BE" dirty="0" err="1"/>
+              <a:t>Slaets</a:t>
+            </a:r>
+            <a:r>
+              <a:rPr lang="nl-BE" dirty="0"/>
+              <a:t>: ~ 1 </a:t>
+            </a:r>
+            <a:r>
+              <a:rPr lang="nl-BE" dirty="0" err="1"/>
+              <a:t>hour</a:t>
+            </a:r>
+            <a:endParaRPr lang="nl-BE" dirty="0"/>
+          </a:p>
+          <a:p>
+            <a:endParaRPr lang="nl-BE" dirty="0"/>
+          </a:p>
+        </p:txBody>
+      </p:sp>
+    </p:spTree>
+    <p:extLst>
+      <p:ext uri="{BB962C8B-B14F-4D97-AF65-F5344CB8AC3E}">
+        <p14:creationId xmlns:p14="http://schemas.microsoft.com/office/powerpoint/2010/main" val="967289705"/>
+      </p:ext>
+    </p:extLst>
+  </p:cSld>
+  <p:clrMapOvr>
+    <a:masterClrMapping/>
+  </p:clrMapOvr>
+</p:sld>
+</file>
+
+<file path=ppt/slides/slide19.xml><?xml version="1.0" encoding="utf-8"?>
+<p:sld xmlns:a="http://schemas.openxmlformats.org/drawingml/2006/main" xmlns:r="http://schemas.openxmlformats.org/officeDocument/2006/relationships" xmlns:p="http://schemas.openxmlformats.org/presentationml/2006/main">
+  <p:cSld>
+    <p:spTree>
+      <p:nvGrpSpPr>
+        <p:cNvPr id="1" name=""/>
+        <p:cNvGrpSpPr/>
+        <p:nvPr/>
+      </p:nvGrpSpPr>
+      <p:grpSpPr>
+        <a:xfrm>
+          <a:off x="0" y="0"/>
+          <a:ext cx="0" cy="0"/>
+          <a:chOff x="0" y="0"/>
+          <a:chExt cx="0" cy="0"/>
+        </a:xfrm>
+      </p:grpSpPr>
+      <p:sp>
+        <p:nvSpPr>
           <p:cNvPr id="2" name="Title 1">
             <a:extLst>
               <a:ext uri="{FF2B5EF4-FFF2-40B4-BE49-F238E27FC236}">
@@ -6851,7 +7510,543 @@
 </p:sld>
 </file>
 
-<file path=ppt/slides/slide16.xml><?xml version="1.0" encoding="utf-8"?>
+<file path=ppt/slides/slide2.xml><?xml version="1.0" encoding="utf-8"?>
+<p:sld xmlns:a="http://schemas.openxmlformats.org/drawingml/2006/main" xmlns:r="http://schemas.openxmlformats.org/officeDocument/2006/relationships" xmlns:p="http://schemas.openxmlformats.org/presentationml/2006/main">
+  <p:cSld>
+    <p:spTree>
+      <p:nvGrpSpPr>
+        <p:cNvPr id="1" name=""/>
+        <p:cNvGrpSpPr/>
+        <p:nvPr/>
+      </p:nvGrpSpPr>
+      <p:grpSpPr>
+        <a:xfrm>
+          <a:off x="0" y="0"/>
+          <a:ext cx="0" cy="0"/>
+          <a:chOff x="0" y="0"/>
+          <a:chExt cx="0" cy="0"/>
+        </a:xfrm>
+      </p:grpSpPr>
+      <p:sp>
+        <p:nvSpPr>
+          <p:cNvPr id="2" name="Title 1">
+            <a:extLst>
+              <a:ext uri="{FF2B5EF4-FFF2-40B4-BE49-F238E27FC236}">
+                <a16:creationId xmlns:a16="http://schemas.microsoft.com/office/drawing/2014/main" id="{78429832-2F06-42D7-9F1B-2C1C5430D48A}"/>
+              </a:ext>
+            </a:extLst>
+          </p:cNvPr>
+          <p:cNvSpPr>
+            <a:spLocks noGrp="1"/>
+          </p:cNvSpPr>
+          <p:nvPr>
+            <p:ph type="title"/>
+          </p:nvPr>
+        </p:nvSpPr>
+        <p:spPr/>
+        <p:txBody>
+          <a:bodyPr/>
+          <a:lstStyle/>
+          <a:p>
+            <a:r>
+              <a:rPr lang="nl-BE" dirty="0"/>
+              <a:t>1. Design</a:t>
+            </a:r>
+            <a:endParaRPr lang="en-US" dirty="0"/>
+          </a:p>
+        </p:txBody>
+      </p:sp>
+      <p:sp>
+        <p:nvSpPr>
+          <p:cNvPr id="3" name="Content Placeholder 2">
+            <a:extLst>
+              <a:ext uri="{FF2B5EF4-FFF2-40B4-BE49-F238E27FC236}">
+                <a16:creationId xmlns:a16="http://schemas.microsoft.com/office/drawing/2014/main" id="{C5AEAD98-A929-45E3-AD5C-8F26AAEC9235}"/>
+              </a:ext>
+            </a:extLst>
+          </p:cNvPr>
+          <p:cNvSpPr>
+            <a:spLocks noGrp="1"/>
+          </p:cNvSpPr>
+          <p:nvPr>
+            <p:ph idx="1"/>
+          </p:nvPr>
+        </p:nvSpPr>
+        <p:spPr/>
+        <p:txBody>
+          <a:bodyPr/>
+          <a:lstStyle/>
+          <a:p>
+            <a:r>
+              <a:rPr lang="nl-BE" sz="2800" dirty="0" err="1"/>
+              <a:t>Pattern</a:t>
+            </a:r>
+            <a:r>
+              <a:rPr lang="nl-BE" sz="2800" dirty="0"/>
+              <a:t>:</a:t>
+            </a:r>
+          </a:p>
+          <a:p>
+            <a:pPr lvl="1"/>
+            <a:r>
+              <a:rPr lang="nl-BE" sz="2400" dirty="0"/>
+              <a:t>Front Controller </a:t>
+            </a:r>
+            <a:r>
+              <a:rPr lang="nl-BE" sz="2400" dirty="0" err="1"/>
+              <a:t>pattern</a:t>
+            </a:r>
+            <a:endParaRPr lang="nl-BE" sz="2400" dirty="0"/>
+          </a:p>
+          <a:p>
+            <a:pPr lvl="2"/>
+            <a:r>
+              <a:rPr lang="nl-BE" sz="1800" dirty="0"/>
+              <a:t>Every UI Object </a:t>
+            </a:r>
+            <a:r>
+              <a:rPr lang="nl-BE" sz="1800" dirty="0" err="1"/>
+              <a:t>uses</a:t>
+            </a:r>
+            <a:r>
+              <a:rPr lang="nl-BE" sz="1800" dirty="0"/>
+              <a:t> his </a:t>
+            </a:r>
+            <a:r>
+              <a:rPr lang="nl-BE" sz="1800" dirty="0" err="1"/>
+              <a:t>reference</a:t>
+            </a:r>
+            <a:r>
+              <a:rPr lang="nl-BE" sz="1800" dirty="0"/>
+              <a:t> to </a:t>
+            </a:r>
+            <a:r>
+              <a:rPr lang="nl-BE" sz="1800" dirty="0" err="1"/>
+              <a:t>the</a:t>
+            </a:r>
+            <a:r>
+              <a:rPr lang="nl-BE" sz="1800" dirty="0"/>
+              <a:t> </a:t>
+            </a:r>
+            <a:r>
+              <a:rPr lang="nl-BE" sz="1800" dirty="0" err="1"/>
+              <a:t>communicationmanager</a:t>
+            </a:r>
+            <a:r>
+              <a:rPr lang="nl-BE" sz="1800" dirty="0"/>
+              <a:t> to </a:t>
+            </a:r>
+            <a:r>
+              <a:rPr lang="nl-BE" sz="1800" dirty="0" err="1"/>
+              <a:t>interact</a:t>
+            </a:r>
+            <a:r>
+              <a:rPr lang="nl-BE" sz="1800" dirty="0"/>
+              <a:t> </a:t>
+            </a:r>
+            <a:r>
+              <a:rPr lang="nl-BE" sz="1800" dirty="0" err="1"/>
+              <a:t>with</a:t>
+            </a:r>
+            <a:r>
+              <a:rPr lang="nl-BE" sz="1800" dirty="0"/>
+              <a:t> </a:t>
+            </a:r>
+            <a:r>
+              <a:rPr lang="nl-BE" sz="1800" dirty="0" err="1"/>
+              <a:t>the</a:t>
+            </a:r>
+            <a:r>
+              <a:rPr lang="nl-BE" sz="1800" dirty="0"/>
+              <a:t> domain.</a:t>
+            </a:r>
+          </a:p>
+          <a:p>
+            <a:pPr lvl="2"/>
+            <a:r>
+              <a:rPr lang="nl-BE" sz="1800" dirty="0">
+                <a:solidFill>
+                  <a:srgbClr val="00B050"/>
+                </a:solidFill>
+              </a:rPr>
+              <a:t>+ No direct access </a:t>
+            </a:r>
+            <a:r>
+              <a:rPr lang="nl-BE" sz="1800" dirty="0" err="1">
+                <a:solidFill>
+                  <a:srgbClr val="00B050"/>
+                </a:solidFill>
+              </a:rPr>
+              <a:t>from</a:t>
+            </a:r>
+            <a:r>
+              <a:rPr lang="nl-BE" sz="1800" dirty="0">
+                <a:solidFill>
+                  <a:srgbClr val="00B050"/>
+                </a:solidFill>
+              </a:rPr>
+              <a:t> UI </a:t>
+            </a:r>
+            <a:r>
+              <a:rPr lang="nl-BE" sz="1800" dirty="0" err="1">
+                <a:solidFill>
+                  <a:srgbClr val="00B050"/>
+                </a:solidFill>
+              </a:rPr>
+              <a:t>Objects</a:t>
+            </a:r>
+            <a:r>
+              <a:rPr lang="nl-BE" sz="1800" dirty="0">
+                <a:solidFill>
+                  <a:srgbClr val="00B050"/>
+                </a:solidFill>
+              </a:rPr>
+              <a:t> to </a:t>
+            </a:r>
+            <a:r>
+              <a:rPr lang="nl-BE" sz="1800" dirty="0" err="1">
+                <a:solidFill>
+                  <a:srgbClr val="00B050"/>
+                </a:solidFill>
+              </a:rPr>
+              <a:t>the</a:t>
+            </a:r>
+            <a:r>
+              <a:rPr lang="nl-BE" sz="1800" dirty="0">
+                <a:solidFill>
+                  <a:srgbClr val="00B050"/>
+                </a:solidFill>
+              </a:rPr>
+              <a:t> domain. ()</a:t>
+            </a:r>
+          </a:p>
+          <a:p>
+            <a:pPr lvl="5"/>
+            <a:r>
+              <a:rPr lang="nl-BE" sz="1800" dirty="0">
+                <a:solidFill>
+                  <a:srgbClr val="00B050"/>
+                </a:solidFill>
+              </a:rPr>
+              <a:t>The domain </a:t>
+            </a:r>
+            <a:r>
+              <a:rPr lang="nl-BE" sz="1800" dirty="0" err="1">
+                <a:solidFill>
+                  <a:srgbClr val="00B050"/>
+                </a:solidFill>
+              </a:rPr>
+              <a:t>can</a:t>
+            </a:r>
+            <a:r>
+              <a:rPr lang="nl-BE" sz="1800" dirty="0">
+                <a:solidFill>
+                  <a:srgbClr val="00B050"/>
+                </a:solidFill>
+              </a:rPr>
+              <a:t> never </a:t>
+            </a:r>
+            <a:r>
+              <a:rPr lang="nl-BE" sz="1800" dirty="0" err="1">
+                <a:solidFill>
+                  <a:srgbClr val="00B050"/>
+                </a:solidFill>
+              </a:rPr>
+              <a:t>be</a:t>
+            </a:r>
+            <a:r>
+              <a:rPr lang="nl-BE" sz="1800" dirty="0">
+                <a:solidFill>
+                  <a:srgbClr val="00B050"/>
+                </a:solidFill>
+              </a:rPr>
+              <a:t> </a:t>
+            </a:r>
+            <a:r>
+              <a:rPr lang="nl-BE" sz="1800" dirty="0" err="1">
+                <a:solidFill>
+                  <a:srgbClr val="00B050"/>
+                </a:solidFill>
+              </a:rPr>
+              <a:t>brought</a:t>
+            </a:r>
+            <a:r>
+              <a:rPr lang="nl-BE" sz="1800" dirty="0">
+                <a:solidFill>
+                  <a:srgbClr val="00B050"/>
+                </a:solidFill>
+              </a:rPr>
+              <a:t> </a:t>
+            </a:r>
+            <a:r>
+              <a:rPr lang="nl-BE" sz="1800" dirty="0" err="1">
+                <a:solidFill>
+                  <a:srgbClr val="00B050"/>
+                </a:solidFill>
+              </a:rPr>
+              <a:t>into</a:t>
+            </a:r>
+            <a:r>
+              <a:rPr lang="nl-BE" sz="1800" dirty="0">
+                <a:solidFill>
+                  <a:srgbClr val="00B050"/>
+                </a:solidFill>
+              </a:rPr>
+              <a:t> </a:t>
+            </a:r>
+            <a:r>
+              <a:rPr lang="nl-BE" sz="1800" dirty="0" err="1">
+                <a:solidFill>
+                  <a:srgbClr val="00B050"/>
+                </a:solidFill>
+              </a:rPr>
+              <a:t>an</a:t>
+            </a:r>
+            <a:r>
+              <a:rPr lang="nl-BE" sz="1800" dirty="0">
+                <a:solidFill>
+                  <a:srgbClr val="00B050"/>
+                </a:solidFill>
+              </a:rPr>
+              <a:t> inconsistent state.</a:t>
+            </a:r>
+          </a:p>
+          <a:p>
+            <a:pPr lvl="2"/>
+            <a:r>
+              <a:rPr lang="nl-BE" sz="1800" dirty="0">
+                <a:solidFill>
+                  <a:srgbClr val="00B050"/>
+                </a:solidFill>
+              </a:rPr>
+              <a:t>+ </a:t>
+            </a:r>
+            <a:r>
+              <a:rPr lang="nl-BE" sz="1800" dirty="0" err="1">
+                <a:solidFill>
+                  <a:srgbClr val="00B050"/>
+                </a:solidFill>
+              </a:rPr>
+              <a:t>Centralized</a:t>
+            </a:r>
+            <a:r>
+              <a:rPr lang="nl-BE" sz="1800" dirty="0">
+                <a:solidFill>
+                  <a:srgbClr val="00B050"/>
+                </a:solidFill>
+              </a:rPr>
+              <a:t> control (</a:t>
+            </a:r>
+            <a:r>
+              <a:rPr lang="nl-BE" sz="1800" b="1" dirty="0">
+                <a:solidFill>
+                  <a:srgbClr val="00B050"/>
+                </a:solidFill>
+              </a:rPr>
+              <a:t>Controller)</a:t>
+            </a:r>
+            <a:endParaRPr lang="nl-BE" sz="1800" dirty="0">
+              <a:solidFill>
+                <a:srgbClr val="00B050"/>
+              </a:solidFill>
+            </a:endParaRPr>
+          </a:p>
+          <a:p>
+            <a:pPr lvl="2"/>
+            <a:r>
+              <a:rPr lang="nl-BE" sz="1800" dirty="0">
+                <a:solidFill>
+                  <a:srgbClr val="00B050"/>
+                </a:solidFill>
+              </a:rPr>
+              <a:t>+ Every object </a:t>
+            </a:r>
+            <a:r>
+              <a:rPr lang="nl-BE" sz="1800" dirty="0" err="1">
+                <a:solidFill>
+                  <a:srgbClr val="00B050"/>
+                </a:solidFill>
+              </a:rPr>
+              <a:t>needs</a:t>
+            </a:r>
+            <a:r>
+              <a:rPr lang="nl-BE" sz="1800" dirty="0">
+                <a:solidFill>
+                  <a:srgbClr val="00B050"/>
+                </a:solidFill>
+              </a:rPr>
+              <a:t> </a:t>
+            </a:r>
+            <a:r>
+              <a:rPr lang="nl-BE" sz="1800" dirty="0" err="1">
+                <a:solidFill>
+                  <a:srgbClr val="00B050"/>
+                </a:solidFill>
+              </a:rPr>
+              <a:t>only</a:t>
+            </a:r>
+            <a:r>
+              <a:rPr lang="nl-BE" sz="1800" dirty="0">
+                <a:solidFill>
+                  <a:srgbClr val="00B050"/>
+                </a:solidFill>
+              </a:rPr>
+              <a:t> </a:t>
+            </a:r>
+            <a:r>
+              <a:rPr lang="nl-BE" sz="1800" dirty="0" err="1">
+                <a:solidFill>
+                  <a:srgbClr val="00B050"/>
+                </a:solidFill>
+              </a:rPr>
+              <a:t>one</a:t>
+            </a:r>
+            <a:r>
+              <a:rPr lang="nl-BE" sz="1800" dirty="0">
+                <a:solidFill>
+                  <a:srgbClr val="00B050"/>
+                </a:solidFill>
+              </a:rPr>
+              <a:t> </a:t>
+            </a:r>
+            <a:r>
+              <a:rPr lang="nl-BE" sz="1800" dirty="0" err="1">
+                <a:solidFill>
+                  <a:srgbClr val="00B050"/>
+                </a:solidFill>
+              </a:rPr>
+              <a:t>reference</a:t>
+            </a:r>
+            <a:r>
+              <a:rPr lang="nl-BE" sz="1800" dirty="0">
+                <a:solidFill>
+                  <a:srgbClr val="00B050"/>
+                </a:solidFill>
+              </a:rPr>
+              <a:t> (</a:t>
+            </a:r>
+            <a:r>
+              <a:rPr lang="nl-BE" sz="1800" b="1" dirty="0">
+                <a:solidFill>
+                  <a:srgbClr val="00B050"/>
+                </a:solidFill>
+              </a:rPr>
+              <a:t>Low </a:t>
+            </a:r>
+            <a:r>
+              <a:rPr lang="nl-BE" sz="1800" b="1" dirty="0" err="1">
+                <a:solidFill>
+                  <a:srgbClr val="00B050"/>
+                </a:solidFill>
+              </a:rPr>
+              <a:t>coupling</a:t>
+            </a:r>
+            <a:r>
+              <a:rPr lang="nl-BE" sz="1800" dirty="0">
+                <a:solidFill>
+                  <a:srgbClr val="00B050"/>
+                </a:solidFill>
+              </a:rPr>
+              <a:t>)</a:t>
+            </a:r>
+          </a:p>
+          <a:p>
+            <a:pPr lvl="2"/>
+            <a:r>
+              <a:rPr lang="nl-BE" sz="1800" dirty="0">
+                <a:solidFill>
+                  <a:srgbClr val="FF0000"/>
+                </a:solidFill>
+              </a:rPr>
+              <a:t>- A lot of </a:t>
+            </a:r>
+            <a:r>
+              <a:rPr lang="nl-BE" sz="1800" dirty="0" err="1">
+                <a:solidFill>
+                  <a:srgbClr val="FF0000"/>
+                </a:solidFill>
+              </a:rPr>
+              <a:t>methods</a:t>
+            </a:r>
+            <a:r>
+              <a:rPr lang="nl-BE" sz="1800" dirty="0">
+                <a:solidFill>
+                  <a:srgbClr val="FF0000"/>
+                </a:solidFill>
+              </a:rPr>
+              <a:t> in </a:t>
+            </a:r>
+            <a:r>
+              <a:rPr lang="nl-BE" sz="1800" dirty="0" err="1">
+                <a:solidFill>
+                  <a:srgbClr val="FF0000"/>
+                </a:solidFill>
+              </a:rPr>
+              <a:t>the</a:t>
+            </a:r>
+            <a:r>
+              <a:rPr lang="nl-BE" sz="1800" dirty="0">
+                <a:solidFill>
+                  <a:srgbClr val="FF0000"/>
+                </a:solidFill>
+              </a:rPr>
+              <a:t> </a:t>
+            </a:r>
+            <a:r>
+              <a:rPr lang="nl-BE" sz="1800" dirty="0" err="1">
+                <a:solidFill>
+                  <a:srgbClr val="FF0000"/>
+                </a:solidFill>
+              </a:rPr>
+              <a:t>communicationmanager</a:t>
+            </a:r>
+            <a:r>
+              <a:rPr lang="nl-BE" sz="1800" dirty="0">
+                <a:solidFill>
+                  <a:srgbClr val="FF0000"/>
+                </a:solidFill>
+              </a:rPr>
+              <a:t> class</a:t>
+            </a:r>
+          </a:p>
+          <a:p>
+            <a:pPr lvl="2"/>
+            <a:endParaRPr lang="nl-BE" sz="1800" dirty="0">
+              <a:solidFill>
+                <a:srgbClr val="00B050"/>
+              </a:solidFill>
+            </a:endParaRPr>
+          </a:p>
+          <a:p>
+            <a:pPr lvl="1"/>
+            <a:endParaRPr lang="nl-BE" sz="2400" dirty="0"/>
+          </a:p>
+          <a:p>
+            <a:pPr lvl="1"/>
+            <a:endParaRPr lang="nl-BE" dirty="0"/>
+          </a:p>
+          <a:p>
+            <a:pPr marL="0" indent="0">
+              <a:buNone/>
+            </a:pPr>
+            <a:endParaRPr lang="en-US" dirty="0"/>
+          </a:p>
+        </p:txBody>
+      </p:sp>
+    </p:spTree>
+    <p:extLst>
+      <p:ext uri="{BB962C8B-B14F-4D97-AF65-F5344CB8AC3E}">
+        <p14:creationId xmlns:p14="http://schemas.microsoft.com/office/powerpoint/2010/main" val="1646264065"/>
+      </p:ext>
+    </p:extLst>
+  </p:cSld>
+  <p:clrMapOvr>
+    <a:masterClrMapping/>
+  </p:clrMapOvr>
+</p:sld>
+</file>
+
+<file path=ppt/slides/slide20.xml><?xml version="1.0" encoding="utf-8"?>
 <p:sld xmlns:a="http://schemas.openxmlformats.org/drawingml/2006/main" xmlns:r="http://schemas.openxmlformats.org/officeDocument/2006/relationships" xmlns:p="http://schemas.openxmlformats.org/presentationml/2006/main">
   <p:cSld>
     <p:spTree>
@@ -6957,7 +8152,7 @@
 </p:sld>
 </file>
 
-<file path=ppt/slides/slide17.xml><?xml version="1.0" encoding="utf-8"?>
+<file path=ppt/slides/slide21.xml><?xml version="1.0" encoding="utf-8"?>
 <p:sld xmlns:a="http://schemas.openxmlformats.org/drawingml/2006/main" xmlns:r="http://schemas.openxmlformats.org/officeDocument/2006/relationships" xmlns:p="http://schemas.openxmlformats.org/presentationml/2006/main">
   <p:cSld>
     <p:spTree>
@@ -7057,7 +8252,7 @@
 </p:sld>
 </file>
 
-<file path=ppt/slides/slide18.xml><?xml version="1.0" encoding="utf-8"?>
+<file path=ppt/slides/slide22.xml><?xml version="1.0" encoding="utf-8"?>
 <p:sld xmlns:a="http://schemas.openxmlformats.org/drawingml/2006/main" xmlns:r="http://schemas.openxmlformats.org/officeDocument/2006/relationships" xmlns:p="http://schemas.openxmlformats.org/presentationml/2006/main">
   <p:cSld>
     <p:spTree>
@@ -7172,7 +8367,7 @@
 </p:sld>
 </file>
 
-<file path=ppt/slides/slide19.xml><?xml version="1.0" encoding="utf-8"?>
+<file path=ppt/slides/slide23.xml><?xml version="1.0" encoding="utf-8"?>
 <p:sld xmlns:a="http://schemas.openxmlformats.org/drawingml/2006/main" xmlns:r="http://schemas.openxmlformats.org/officeDocument/2006/relationships" xmlns:p="http://schemas.openxmlformats.org/presentationml/2006/main">
   <p:cSld>
     <p:spTree>
@@ -7287,543 +8482,7 @@
 </p:sld>
 </file>
 
-<file path=ppt/slides/slide2.xml><?xml version="1.0" encoding="utf-8"?>
-<p:sld xmlns:a="http://schemas.openxmlformats.org/drawingml/2006/main" xmlns:r="http://schemas.openxmlformats.org/officeDocument/2006/relationships" xmlns:p="http://schemas.openxmlformats.org/presentationml/2006/main">
-  <p:cSld>
-    <p:spTree>
-      <p:nvGrpSpPr>
-        <p:cNvPr id="1" name=""/>
-        <p:cNvGrpSpPr/>
-        <p:nvPr/>
-      </p:nvGrpSpPr>
-      <p:grpSpPr>
-        <a:xfrm>
-          <a:off x="0" y="0"/>
-          <a:ext cx="0" cy="0"/>
-          <a:chOff x="0" y="0"/>
-          <a:chExt cx="0" cy="0"/>
-        </a:xfrm>
-      </p:grpSpPr>
-      <p:sp>
-        <p:nvSpPr>
-          <p:cNvPr id="2" name="Title 1">
-            <a:extLst>
-              <a:ext uri="{FF2B5EF4-FFF2-40B4-BE49-F238E27FC236}">
-                <a16:creationId xmlns:a16="http://schemas.microsoft.com/office/drawing/2014/main" id="{78429832-2F06-42D7-9F1B-2C1C5430D48A}"/>
-              </a:ext>
-            </a:extLst>
-          </p:cNvPr>
-          <p:cNvSpPr>
-            <a:spLocks noGrp="1"/>
-          </p:cNvSpPr>
-          <p:nvPr>
-            <p:ph type="title"/>
-          </p:nvPr>
-        </p:nvSpPr>
-        <p:spPr/>
-        <p:txBody>
-          <a:bodyPr/>
-          <a:lstStyle/>
-          <a:p>
-            <a:r>
-              <a:rPr lang="nl-BE" dirty="0"/>
-              <a:t>1. Design</a:t>
-            </a:r>
-            <a:endParaRPr lang="en-US" dirty="0"/>
-          </a:p>
-        </p:txBody>
-      </p:sp>
-      <p:sp>
-        <p:nvSpPr>
-          <p:cNvPr id="3" name="Content Placeholder 2">
-            <a:extLst>
-              <a:ext uri="{FF2B5EF4-FFF2-40B4-BE49-F238E27FC236}">
-                <a16:creationId xmlns:a16="http://schemas.microsoft.com/office/drawing/2014/main" id="{C5AEAD98-A929-45E3-AD5C-8F26AAEC9235}"/>
-              </a:ext>
-            </a:extLst>
-          </p:cNvPr>
-          <p:cNvSpPr>
-            <a:spLocks noGrp="1"/>
-          </p:cNvSpPr>
-          <p:nvPr>
-            <p:ph idx="1"/>
-          </p:nvPr>
-        </p:nvSpPr>
-        <p:spPr/>
-        <p:txBody>
-          <a:bodyPr/>
-          <a:lstStyle/>
-          <a:p>
-            <a:r>
-              <a:rPr lang="nl-BE" sz="2800" dirty="0" err="1"/>
-              <a:t>Pattern</a:t>
-            </a:r>
-            <a:r>
-              <a:rPr lang="nl-BE" sz="2800" dirty="0"/>
-              <a:t>:</a:t>
-            </a:r>
-          </a:p>
-          <a:p>
-            <a:pPr lvl="1"/>
-            <a:r>
-              <a:rPr lang="nl-BE" sz="2400" dirty="0"/>
-              <a:t>Front Controller </a:t>
-            </a:r>
-            <a:r>
-              <a:rPr lang="nl-BE" sz="2400" dirty="0" err="1"/>
-              <a:t>pattern</a:t>
-            </a:r>
-            <a:endParaRPr lang="nl-BE" sz="2400" dirty="0"/>
-          </a:p>
-          <a:p>
-            <a:pPr lvl="2"/>
-            <a:r>
-              <a:rPr lang="nl-BE" sz="1800" dirty="0"/>
-              <a:t>Every UI Object </a:t>
-            </a:r>
-            <a:r>
-              <a:rPr lang="nl-BE" sz="1800" dirty="0" err="1"/>
-              <a:t>uses</a:t>
-            </a:r>
-            <a:r>
-              <a:rPr lang="nl-BE" sz="1800" dirty="0"/>
-              <a:t> his </a:t>
-            </a:r>
-            <a:r>
-              <a:rPr lang="nl-BE" sz="1800" dirty="0" err="1"/>
-              <a:t>reference</a:t>
-            </a:r>
-            <a:r>
-              <a:rPr lang="nl-BE" sz="1800" dirty="0"/>
-              <a:t> to </a:t>
-            </a:r>
-            <a:r>
-              <a:rPr lang="nl-BE" sz="1800" dirty="0" err="1"/>
-              <a:t>the</a:t>
-            </a:r>
-            <a:r>
-              <a:rPr lang="nl-BE" sz="1800" dirty="0"/>
-              <a:t> </a:t>
-            </a:r>
-            <a:r>
-              <a:rPr lang="nl-BE" sz="1800" dirty="0" err="1"/>
-              <a:t>communicationmanager</a:t>
-            </a:r>
-            <a:r>
-              <a:rPr lang="nl-BE" sz="1800" dirty="0"/>
-              <a:t> to </a:t>
-            </a:r>
-            <a:r>
-              <a:rPr lang="nl-BE" sz="1800" dirty="0" err="1"/>
-              <a:t>interact</a:t>
-            </a:r>
-            <a:r>
-              <a:rPr lang="nl-BE" sz="1800" dirty="0"/>
-              <a:t> </a:t>
-            </a:r>
-            <a:r>
-              <a:rPr lang="nl-BE" sz="1800" dirty="0" err="1"/>
-              <a:t>with</a:t>
-            </a:r>
-            <a:r>
-              <a:rPr lang="nl-BE" sz="1800" dirty="0"/>
-              <a:t> </a:t>
-            </a:r>
-            <a:r>
-              <a:rPr lang="nl-BE" sz="1800" dirty="0" err="1"/>
-              <a:t>the</a:t>
-            </a:r>
-            <a:r>
-              <a:rPr lang="nl-BE" sz="1800" dirty="0"/>
-              <a:t> domain.</a:t>
-            </a:r>
-          </a:p>
-          <a:p>
-            <a:pPr lvl="2"/>
-            <a:r>
-              <a:rPr lang="nl-BE" sz="1800" dirty="0">
-                <a:solidFill>
-                  <a:srgbClr val="00B050"/>
-                </a:solidFill>
-              </a:rPr>
-              <a:t>+ No direct access </a:t>
-            </a:r>
-            <a:r>
-              <a:rPr lang="nl-BE" sz="1800" dirty="0" err="1">
-                <a:solidFill>
-                  <a:srgbClr val="00B050"/>
-                </a:solidFill>
-              </a:rPr>
-              <a:t>from</a:t>
-            </a:r>
-            <a:r>
-              <a:rPr lang="nl-BE" sz="1800" dirty="0">
-                <a:solidFill>
-                  <a:srgbClr val="00B050"/>
-                </a:solidFill>
-              </a:rPr>
-              <a:t> UI </a:t>
-            </a:r>
-            <a:r>
-              <a:rPr lang="nl-BE" sz="1800" dirty="0" err="1">
-                <a:solidFill>
-                  <a:srgbClr val="00B050"/>
-                </a:solidFill>
-              </a:rPr>
-              <a:t>Objects</a:t>
-            </a:r>
-            <a:r>
-              <a:rPr lang="nl-BE" sz="1800" dirty="0">
-                <a:solidFill>
-                  <a:srgbClr val="00B050"/>
-                </a:solidFill>
-              </a:rPr>
-              <a:t> to </a:t>
-            </a:r>
-            <a:r>
-              <a:rPr lang="nl-BE" sz="1800" dirty="0" err="1">
-                <a:solidFill>
-                  <a:srgbClr val="00B050"/>
-                </a:solidFill>
-              </a:rPr>
-              <a:t>the</a:t>
-            </a:r>
-            <a:r>
-              <a:rPr lang="nl-BE" sz="1800" dirty="0">
-                <a:solidFill>
-                  <a:srgbClr val="00B050"/>
-                </a:solidFill>
-              </a:rPr>
-              <a:t> domain. ()</a:t>
-            </a:r>
-          </a:p>
-          <a:p>
-            <a:pPr lvl="5"/>
-            <a:r>
-              <a:rPr lang="nl-BE" sz="1800" dirty="0">
-                <a:solidFill>
-                  <a:srgbClr val="00B050"/>
-                </a:solidFill>
-              </a:rPr>
-              <a:t>The domain </a:t>
-            </a:r>
-            <a:r>
-              <a:rPr lang="nl-BE" sz="1800" dirty="0" err="1">
-                <a:solidFill>
-                  <a:srgbClr val="00B050"/>
-                </a:solidFill>
-              </a:rPr>
-              <a:t>can</a:t>
-            </a:r>
-            <a:r>
-              <a:rPr lang="nl-BE" sz="1800" dirty="0">
-                <a:solidFill>
-                  <a:srgbClr val="00B050"/>
-                </a:solidFill>
-              </a:rPr>
-              <a:t> never </a:t>
-            </a:r>
-            <a:r>
-              <a:rPr lang="nl-BE" sz="1800" dirty="0" err="1">
-                <a:solidFill>
-                  <a:srgbClr val="00B050"/>
-                </a:solidFill>
-              </a:rPr>
-              <a:t>be</a:t>
-            </a:r>
-            <a:r>
-              <a:rPr lang="nl-BE" sz="1800" dirty="0">
-                <a:solidFill>
-                  <a:srgbClr val="00B050"/>
-                </a:solidFill>
-              </a:rPr>
-              <a:t> </a:t>
-            </a:r>
-            <a:r>
-              <a:rPr lang="nl-BE" sz="1800" dirty="0" err="1">
-                <a:solidFill>
-                  <a:srgbClr val="00B050"/>
-                </a:solidFill>
-              </a:rPr>
-              <a:t>brought</a:t>
-            </a:r>
-            <a:r>
-              <a:rPr lang="nl-BE" sz="1800" dirty="0">
-                <a:solidFill>
-                  <a:srgbClr val="00B050"/>
-                </a:solidFill>
-              </a:rPr>
-              <a:t> </a:t>
-            </a:r>
-            <a:r>
-              <a:rPr lang="nl-BE" sz="1800" dirty="0" err="1">
-                <a:solidFill>
-                  <a:srgbClr val="00B050"/>
-                </a:solidFill>
-              </a:rPr>
-              <a:t>into</a:t>
-            </a:r>
-            <a:r>
-              <a:rPr lang="nl-BE" sz="1800" dirty="0">
-                <a:solidFill>
-                  <a:srgbClr val="00B050"/>
-                </a:solidFill>
-              </a:rPr>
-              <a:t> </a:t>
-            </a:r>
-            <a:r>
-              <a:rPr lang="nl-BE" sz="1800" dirty="0" err="1">
-                <a:solidFill>
-                  <a:srgbClr val="00B050"/>
-                </a:solidFill>
-              </a:rPr>
-              <a:t>an</a:t>
-            </a:r>
-            <a:r>
-              <a:rPr lang="nl-BE" sz="1800" dirty="0">
-                <a:solidFill>
-                  <a:srgbClr val="00B050"/>
-                </a:solidFill>
-              </a:rPr>
-              <a:t> inconsistent state.</a:t>
-            </a:r>
-          </a:p>
-          <a:p>
-            <a:pPr lvl="2"/>
-            <a:r>
-              <a:rPr lang="nl-BE" sz="1800" dirty="0">
-                <a:solidFill>
-                  <a:srgbClr val="00B050"/>
-                </a:solidFill>
-              </a:rPr>
-              <a:t>+ </a:t>
-            </a:r>
-            <a:r>
-              <a:rPr lang="nl-BE" sz="1800" dirty="0" err="1">
-                <a:solidFill>
-                  <a:srgbClr val="00B050"/>
-                </a:solidFill>
-              </a:rPr>
-              <a:t>Centralized</a:t>
-            </a:r>
-            <a:r>
-              <a:rPr lang="nl-BE" sz="1800" dirty="0">
-                <a:solidFill>
-                  <a:srgbClr val="00B050"/>
-                </a:solidFill>
-              </a:rPr>
-              <a:t> control (</a:t>
-            </a:r>
-            <a:r>
-              <a:rPr lang="nl-BE" sz="1800" b="1" dirty="0">
-                <a:solidFill>
-                  <a:srgbClr val="00B050"/>
-                </a:solidFill>
-              </a:rPr>
-              <a:t>Controller)</a:t>
-            </a:r>
-            <a:endParaRPr lang="nl-BE" sz="1800" dirty="0">
-              <a:solidFill>
-                <a:srgbClr val="00B050"/>
-              </a:solidFill>
-            </a:endParaRPr>
-          </a:p>
-          <a:p>
-            <a:pPr lvl="2"/>
-            <a:r>
-              <a:rPr lang="nl-BE" sz="1800" dirty="0">
-                <a:solidFill>
-                  <a:srgbClr val="00B050"/>
-                </a:solidFill>
-              </a:rPr>
-              <a:t>+ Every object </a:t>
-            </a:r>
-            <a:r>
-              <a:rPr lang="nl-BE" sz="1800" dirty="0" err="1">
-                <a:solidFill>
-                  <a:srgbClr val="00B050"/>
-                </a:solidFill>
-              </a:rPr>
-              <a:t>needs</a:t>
-            </a:r>
-            <a:r>
-              <a:rPr lang="nl-BE" sz="1800" dirty="0">
-                <a:solidFill>
-                  <a:srgbClr val="00B050"/>
-                </a:solidFill>
-              </a:rPr>
-              <a:t> </a:t>
-            </a:r>
-            <a:r>
-              <a:rPr lang="nl-BE" sz="1800" dirty="0" err="1">
-                <a:solidFill>
-                  <a:srgbClr val="00B050"/>
-                </a:solidFill>
-              </a:rPr>
-              <a:t>only</a:t>
-            </a:r>
-            <a:r>
-              <a:rPr lang="nl-BE" sz="1800" dirty="0">
-                <a:solidFill>
-                  <a:srgbClr val="00B050"/>
-                </a:solidFill>
-              </a:rPr>
-              <a:t> </a:t>
-            </a:r>
-            <a:r>
-              <a:rPr lang="nl-BE" sz="1800" dirty="0" err="1">
-                <a:solidFill>
-                  <a:srgbClr val="00B050"/>
-                </a:solidFill>
-              </a:rPr>
-              <a:t>one</a:t>
-            </a:r>
-            <a:r>
-              <a:rPr lang="nl-BE" sz="1800" dirty="0">
-                <a:solidFill>
-                  <a:srgbClr val="00B050"/>
-                </a:solidFill>
-              </a:rPr>
-              <a:t> </a:t>
-            </a:r>
-            <a:r>
-              <a:rPr lang="nl-BE" sz="1800" dirty="0" err="1">
-                <a:solidFill>
-                  <a:srgbClr val="00B050"/>
-                </a:solidFill>
-              </a:rPr>
-              <a:t>reference</a:t>
-            </a:r>
-            <a:r>
-              <a:rPr lang="nl-BE" sz="1800" dirty="0">
-                <a:solidFill>
-                  <a:srgbClr val="00B050"/>
-                </a:solidFill>
-              </a:rPr>
-              <a:t> (</a:t>
-            </a:r>
-            <a:r>
-              <a:rPr lang="nl-BE" sz="1800" b="1" dirty="0">
-                <a:solidFill>
-                  <a:srgbClr val="00B050"/>
-                </a:solidFill>
-              </a:rPr>
-              <a:t>Low </a:t>
-            </a:r>
-            <a:r>
-              <a:rPr lang="nl-BE" sz="1800" b="1" dirty="0" err="1">
-                <a:solidFill>
-                  <a:srgbClr val="00B050"/>
-                </a:solidFill>
-              </a:rPr>
-              <a:t>coupling</a:t>
-            </a:r>
-            <a:r>
-              <a:rPr lang="nl-BE" sz="1800" dirty="0">
-                <a:solidFill>
-                  <a:srgbClr val="00B050"/>
-                </a:solidFill>
-              </a:rPr>
-              <a:t>)</a:t>
-            </a:r>
-          </a:p>
-          <a:p>
-            <a:pPr lvl="2"/>
-            <a:r>
-              <a:rPr lang="nl-BE" sz="1800" dirty="0">
-                <a:solidFill>
-                  <a:srgbClr val="FF0000"/>
-                </a:solidFill>
-              </a:rPr>
-              <a:t>- A lot of </a:t>
-            </a:r>
-            <a:r>
-              <a:rPr lang="nl-BE" sz="1800" dirty="0" err="1">
-                <a:solidFill>
-                  <a:srgbClr val="FF0000"/>
-                </a:solidFill>
-              </a:rPr>
-              <a:t>methods</a:t>
-            </a:r>
-            <a:r>
-              <a:rPr lang="nl-BE" sz="1800" dirty="0">
-                <a:solidFill>
-                  <a:srgbClr val="FF0000"/>
-                </a:solidFill>
-              </a:rPr>
-              <a:t> in </a:t>
-            </a:r>
-            <a:r>
-              <a:rPr lang="nl-BE" sz="1800" dirty="0" err="1">
-                <a:solidFill>
-                  <a:srgbClr val="FF0000"/>
-                </a:solidFill>
-              </a:rPr>
-              <a:t>the</a:t>
-            </a:r>
-            <a:r>
-              <a:rPr lang="nl-BE" sz="1800" dirty="0">
-                <a:solidFill>
-                  <a:srgbClr val="FF0000"/>
-                </a:solidFill>
-              </a:rPr>
-              <a:t> </a:t>
-            </a:r>
-            <a:r>
-              <a:rPr lang="nl-BE" sz="1800" dirty="0" err="1">
-                <a:solidFill>
-                  <a:srgbClr val="FF0000"/>
-                </a:solidFill>
-              </a:rPr>
-              <a:t>communicationmanager</a:t>
-            </a:r>
-            <a:r>
-              <a:rPr lang="nl-BE" sz="1800" dirty="0">
-                <a:solidFill>
-                  <a:srgbClr val="FF0000"/>
-                </a:solidFill>
-              </a:rPr>
-              <a:t> class</a:t>
-            </a:r>
-          </a:p>
-          <a:p>
-            <a:pPr lvl="2"/>
-            <a:endParaRPr lang="nl-BE" sz="1800" dirty="0">
-              <a:solidFill>
-                <a:srgbClr val="00B050"/>
-              </a:solidFill>
-            </a:endParaRPr>
-          </a:p>
-          <a:p>
-            <a:pPr lvl="1"/>
-            <a:endParaRPr lang="nl-BE" sz="2400" dirty="0"/>
-          </a:p>
-          <a:p>
-            <a:pPr lvl="1"/>
-            <a:endParaRPr lang="nl-BE" dirty="0"/>
-          </a:p>
-          <a:p>
-            <a:pPr marL="0" indent="0">
-              <a:buNone/>
-            </a:pPr>
-            <a:endParaRPr lang="en-US" dirty="0"/>
-          </a:p>
-        </p:txBody>
-      </p:sp>
-    </p:spTree>
-    <p:extLst>
-      <p:ext uri="{BB962C8B-B14F-4D97-AF65-F5344CB8AC3E}">
-        <p14:creationId xmlns:p14="http://schemas.microsoft.com/office/powerpoint/2010/main" val="1646264065"/>
-      </p:ext>
-    </p:extLst>
-  </p:cSld>
-  <p:clrMapOvr>
-    <a:masterClrMapping/>
-  </p:clrMapOvr>
-</p:sld>
-</file>
-
-<file path=ppt/slides/slide20.xml><?xml version="1.0" encoding="utf-8"?>
+<file path=ppt/slides/slide24.xml><?xml version="1.0" encoding="utf-8"?>
 <p:sld xmlns:a="http://schemas.openxmlformats.org/drawingml/2006/main" xmlns:r="http://schemas.openxmlformats.org/officeDocument/2006/relationships" xmlns:p="http://schemas.openxmlformats.org/presentationml/2006/main">
   <p:cSld>
     <p:spTree>
@@ -7921,7 +8580,7 @@
 </p:sld>
 </file>
 
-<file path=ppt/slides/slide21.xml><?xml version="1.0" encoding="utf-8"?>
+<file path=ppt/slides/slide25.xml><?xml version="1.0" encoding="utf-8"?>
 <p:sld xmlns:a="http://schemas.openxmlformats.org/drawingml/2006/main" xmlns:r="http://schemas.openxmlformats.org/officeDocument/2006/relationships" xmlns:p="http://schemas.openxmlformats.org/presentationml/2006/main">
   <p:cSld>
     <p:spTree>
@@ -8019,7 +8678,7 @@
 </p:sld>
 </file>
 
-<file path=ppt/slides/slide22.xml><?xml version="1.0" encoding="utf-8"?>
+<file path=ppt/slides/slide26.xml><?xml version="1.0" encoding="utf-8"?>
 <p:sld xmlns:a="http://schemas.openxmlformats.org/drawingml/2006/main" xmlns:r="http://schemas.openxmlformats.org/officeDocument/2006/relationships" xmlns:p="http://schemas.openxmlformats.org/presentationml/2006/main">
   <p:cSld>
     <p:spTree>
@@ -8121,7 +8780,7 @@
 </p:sld>
 </file>
 
-<file path=ppt/slides/slide23.xml><?xml version="1.0" encoding="utf-8"?>
+<file path=ppt/slides/slide27.xml><?xml version="1.0" encoding="utf-8"?>
 <p:sld xmlns:a="http://schemas.openxmlformats.org/drawingml/2006/main" xmlns:r="http://schemas.openxmlformats.org/officeDocument/2006/relationships" xmlns:p="http://schemas.openxmlformats.org/presentationml/2006/main">
   <p:cSld>
     <p:spTree>
@@ -8232,7 +8891,7 @@
 </p:sld>
 </file>
 
-<file path=ppt/slides/slide24.xml><?xml version="1.0" encoding="utf-8"?>
+<file path=ppt/slides/slide28.xml><?xml version="1.0" encoding="utf-8"?>
 <p:sld xmlns:a="http://schemas.openxmlformats.org/drawingml/2006/main" xmlns:r="http://schemas.openxmlformats.org/officeDocument/2006/relationships" xmlns:p="http://schemas.openxmlformats.org/presentationml/2006/main">
   <p:cSld>
     <p:spTree>
@@ -8341,7 +9000,7 @@
 </p:sld>
 </file>
 
-<file path=ppt/slides/slide25.xml><?xml version="1.0" encoding="utf-8"?>
+<file path=ppt/slides/slide29.xml><?xml version="1.0" encoding="utf-8"?>
 <p:sld xmlns:a="http://schemas.openxmlformats.org/drawingml/2006/main" xmlns:r="http://schemas.openxmlformats.org/officeDocument/2006/relationships" xmlns:p="http://schemas.openxmlformats.org/presentationml/2006/main">
   <p:cSld>
     <p:spTree>
@@ -8442,478 +9101,6 @@
     <p:extLst>
       <p:ext uri="{BB962C8B-B14F-4D97-AF65-F5344CB8AC3E}">
         <p14:creationId xmlns:p14="http://schemas.microsoft.com/office/powerpoint/2010/main" val="2675401575"/>
-      </p:ext>
-    </p:extLst>
-  </p:cSld>
-  <p:clrMapOvr>
-    <a:masterClrMapping/>
-  </p:clrMapOvr>
-</p:sld>
-</file>
-
-<file path=ppt/slides/slide26.xml><?xml version="1.0" encoding="utf-8"?>
-<p:sld xmlns:a="http://schemas.openxmlformats.org/drawingml/2006/main" xmlns:r="http://schemas.openxmlformats.org/officeDocument/2006/relationships" xmlns:p="http://schemas.openxmlformats.org/presentationml/2006/main">
-  <p:cSld>
-    <p:spTree>
-      <p:nvGrpSpPr>
-        <p:cNvPr id="1" name=""/>
-        <p:cNvGrpSpPr/>
-        <p:nvPr/>
-      </p:nvGrpSpPr>
-      <p:grpSpPr>
-        <a:xfrm>
-          <a:off x="0" y="0"/>
-          <a:ext cx="0" cy="0"/>
-          <a:chOff x="0" y="0"/>
-          <a:chExt cx="0" cy="0"/>
-        </a:xfrm>
-      </p:grpSpPr>
-      <p:sp>
-        <p:nvSpPr>
-          <p:cNvPr id="2" name="Title 1">
-            <a:extLst>
-              <a:ext uri="{FF2B5EF4-FFF2-40B4-BE49-F238E27FC236}">
-                <a16:creationId xmlns:a16="http://schemas.microsoft.com/office/drawing/2014/main" id="{01B95CCF-9AB0-4B00-AF83-34AF084B3137}"/>
-              </a:ext>
-            </a:extLst>
-          </p:cNvPr>
-          <p:cNvSpPr>
-            <a:spLocks noGrp="1"/>
-          </p:cNvSpPr>
-          <p:nvPr>
-            <p:ph type="title"/>
-          </p:nvPr>
-        </p:nvSpPr>
-        <p:spPr/>
-        <p:txBody>
-          <a:bodyPr/>
-          <a:lstStyle/>
-          <a:p>
-            <a:r>
-              <a:rPr lang="nl-BE" dirty="0"/>
-              <a:t>6. </a:t>
-            </a:r>
-            <a:r>
-              <a:rPr lang="nl-BE" dirty="0" err="1"/>
-              <a:t>Edit</a:t>
-            </a:r>
-            <a:r>
-              <a:rPr lang="nl-BE" dirty="0"/>
-              <a:t> Column </a:t>
-            </a:r>
-            <a:r>
-              <a:rPr lang="nl-BE" dirty="0" err="1"/>
-              <a:t>Characteristic</a:t>
-            </a:r>
-            <a:r>
-              <a:rPr lang="nl-BE" dirty="0"/>
-              <a:t> (c)</a:t>
-            </a:r>
-            <a:endParaRPr lang="en-US" dirty="0"/>
-          </a:p>
-        </p:txBody>
-      </p:sp>
-      <p:pic>
-        <p:nvPicPr>
-          <p:cNvPr id="5" name="Content Placeholder 4">
-            <a:extLst>
-              <a:ext uri="{FF2B5EF4-FFF2-40B4-BE49-F238E27FC236}">
-                <a16:creationId xmlns:a16="http://schemas.microsoft.com/office/drawing/2014/main" id="{6738299C-111A-4A2D-8F19-83CDE4499729}"/>
-              </a:ext>
-            </a:extLst>
-          </p:cNvPr>
-          <p:cNvPicPr>
-            <a:picLocks noGrp="1" noChangeAspect="1"/>
-          </p:cNvPicPr>
-          <p:nvPr>
-            <p:ph idx="1"/>
-          </p:nvPr>
-        </p:nvPicPr>
-        <p:blipFill>
-          <a:blip r:embed="rId2">
-            <a:extLst>
-              <a:ext uri="{28A0092B-C50C-407E-A947-70E740481C1C}">
-                <a14:useLocalDpi xmlns:a14="http://schemas.microsoft.com/office/drawing/2010/main" val="0"/>
-              </a:ext>
-            </a:extLst>
-          </a:blip>
-          <a:stretch>
-            <a:fillRect/>
-          </a:stretch>
-        </p:blipFill>
-        <p:spPr>
-          <a:xfrm>
-            <a:off x="391947" y="1737360"/>
-            <a:ext cx="11408105" cy="4381373"/>
-          </a:xfrm>
-        </p:spPr>
-      </p:pic>
-      <p:sp>
-        <p:nvSpPr>
-          <p:cNvPr id="6" name="Rectangle 5">
-            <a:extLst>
-              <a:ext uri="{FF2B5EF4-FFF2-40B4-BE49-F238E27FC236}">
-                <a16:creationId xmlns:a16="http://schemas.microsoft.com/office/drawing/2014/main" id="{716EDE25-B667-4BE5-B83B-F2DE57A67A04}"/>
-              </a:ext>
-            </a:extLst>
-          </p:cNvPr>
-          <p:cNvSpPr/>
-          <p:nvPr/>
-        </p:nvSpPr>
-        <p:spPr>
-          <a:xfrm>
-            <a:off x="8061649" y="1737360"/>
-            <a:ext cx="1735494" cy="1015171"/>
-          </a:xfrm>
-          <a:prstGeom prst="rect">
-            <a:avLst/>
-          </a:prstGeom>
-          <a:solidFill>
-            <a:schemeClr val="bg1"/>
-          </a:solidFill>
-          <a:ln>
-            <a:noFill/>
-          </a:ln>
-        </p:spPr>
-        <p:style>
-          <a:lnRef idx="2">
-            <a:schemeClr val="accent1">
-              <a:shade val="50000"/>
-            </a:schemeClr>
-          </a:lnRef>
-          <a:fillRef idx="1">
-            <a:schemeClr val="accent1"/>
-          </a:fillRef>
-          <a:effectRef idx="0">
-            <a:schemeClr val="accent1"/>
-          </a:effectRef>
-          <a:fontRef idx="minor">
-            <a:schemeClr val="lt1"/>
-          </a:fontRef>
-        </p:style>
-        <p:txBody>
-          <a:bodyPr rtlCol="0" anchor="ctr"/>
-          <a:lstStyle/>
-          <a:p>
-            <a:pPr algn="ctr"/>
-            <a:endParaRPr lang="en-US"/>
-          </a:p>
-        </p:txBody>
-      </p:sp>
-    </p:spTree>
-    <p:extLst>
-      <p:ext uri="{BB962C8B-B14F-4D97-AF65-F5344CB8AC3E}">
-        <p14:creationId xmlns:p14="http://schemas.microsoft.com/office/powerpoint/2010/main" val="4122151920"/>
-      </p:ext>
-    </p:extLst>
-  </p:cSld>
-  <p:clrMapOvr>
-    <a:masterClrMapping/>
-  </p:clrMapOvr>
-</p:sld>
-</file>
-
-<file path=ppt/slides/slide27.xml><?xml version="1.0" encoding="utf-8"?>
-<p:sld xmlns:a="http://schemas.openxmlformats.org/drawingml/2006/main" xmlns:r="http://schemas.openxmlformats.org/officeDocument/2006/relationships" xmlns:p="http://schemas.openxmlformats.org/presentationml/2006/main">
-  <p:cSld>
-    <p:spTree>
-      <p:nvGrpSpPr>
-        <p:cNvPr id="1" name=""/>
-        <p:cNvGrpSpPr/>
-        <p:nvPr/>
-      </p:nvGrpSpPr>
-      <p:grpSpPr>
-        <a:xfrm>
-          <a:off x="0" y="0"/>
-          <a:ext cx="0" cy="0"/>
-          <a:chOff x="0" y="0"/>
-          <a:chExt cx="0" cy="0"/>
-        </a:xfrm>
-      </p:grpSpPr>
-      <p:pic>
-        <p:nvPicPr>
-          <p:cNvPr id="5" name="Content Placeholder 4">
-            <a:extLst>
-              <a:ext uri="{FF2B5EF4-FFF2-40B4-BE49-F238E27FC236}">
-                <a16:creationId xmlns:a16="http://schemas.microsoft.com/office/drawing/2014/main" id="{700D8207-ADC9-4674-9222-568FED3BF933}"/>
-              </a:ext>
-            </a:extLst>
-          </p:cNvPr>
-          <p:cNvPicPr>
-            <a:picLocks noGrp="1" noChangeAspect="1"/>
-          </p:cNvPicPr>
-          <p:nvPr>
-            <p:ph idx="1"/>
-          </p:nvPr>
-        </p:nvPicPr>
-        <p:blipFill>
-          <a:blip r:embed="rId2">
-            <a:extLst>
-              <a:ext uri="{28A0092B-C50C-407E-A947-70E740481C1C}">
-                <a14:useLocalDpi xmlns:a14="http://schemas.microsoft.com/office/drawing/2010/main" val="0"/>
-              </a:ext>
-            </a:extLst>
-          </a:blip>
-          <a:stretch>
-            <a:fillRect/>
-          </a:stretch>
-        </p:blipFill>
-        <p:spPr>
-          <a:xfrm>
-            <a:off x="1818227" y="1221110"/>
-            <a:ext cx="9337453" cy="5151698"/>
-          </a:xfrm>
-        </p:spPr>
-      </p:pic>
-      <p:sp>
-        <p:nvSpPr>
-          <p:cNvPr id="2" name="Title 1">
-            <a:extLst>
-              <a:ext uri="{FF2B5EF4-FFF2-40B4-BE49-F238E27FC236}">
-                <a16:creationId xmlns:a16="http://schemas.microsoft.com/office/drawing/2014/main" id="{B7363E8D-7849-45BA-B36F-F33F3F03E579}"/>
-              </a:ext>
-            </a:extLst>
-          </p:cNvPr>
-          <p:cNvSpPr>
-            <a:spLocks noGrp="1"/>
-          </p:cNvSpPr>
-          <p:nvPr>
-            <p:ph type="title"/>
-          </p:nvPr>
-        </p:nvSpPr>
-        <p:spPr/>
-        <p:txBody>
-          <a:bodyPr/>
-          <a:lstStyle/>
-          <a:p>
-            <a:r>
-              <a:rPr lang="nl-BE" dirty="0"/>
-              <a:t>7. Delete Column</a:t>
-            </a:r>
-            <a:endParaRPr lang="en-US" dirty="0"/>
-          </a:p>
-        </p:txBody>
-      </p:sp>
-    </p:spTree>
-    <p:extLst>
-      <p:ext uri="{BB962C8B-B14F-4D97-AF65-F5344CB8AC3E}">
-        <p14:creationId xmlns:p14="http://schemas.microsoft.com/office/powerpoint/2010/main" val="1061075301"/>
-      </p:ext>
-    </p:extLst>
-  </p:cSld>
-  <p:clrMapOvr>
-    <a:masterClrMapping/>
-  </p:clrMapOvr>
-</p:sld>
-</file>
-
-<file path=ppt/slides/slide28.xml><?xml version="1.0" encoding="utf-8"?>
-<p:sld xmlns:a="http://schemas.openxmlformats.org/drawingml/2006/main" xmlns:r="http://schemas.openxmlformats.org/officeDocument/2006/relationships" xmlns:p="http://schemas.openxmlformats.org/presentationml/2006/main">
-  <p:cSld>
-    <p:spTree>
-      <p:nvGrpSpPr>
-        <p:cNvPr id="1" name=""/>
-        <p:cNvGrpSpPr/>
-        <p:nvPr/>
-      </p:nvGrpSpPr>
-      <p:grpSpPr>
-        <a:xfrm>
-          <a:off x="0" y="0"/>
-          <a:ext cx="0" cy="0"/>
-          <a:chOff x="0" y="0"/>
-          <a:chExt cx="0" cy="0"/>
-        </a:xfrm>
-      </p:grpSpPr>
-      <p:pic>
-        <p:nvPicPr>
-          <p:cNvPr id="5" name="Content Placeholder 4">
-            <a:extLst>
-              <a:ext uri="{FF2B5EF4-FFF2-40B4-BE49-F238E27FC236}">
-                <a16:creationId xmlns:a16="http://schemas.microsoft.com/office/drawing/2014/main" id="{858CECC6-FF97-4BE0-900D-82973106F233}"/>
-              </a:ext>
-            </a:extLst>
-          </p:cNvPr>
-          <p:cNvPicPr>
-            <a:picLocks noGrp="1" noChangeAspect="1"/>
-          </p:cNvPicPr>
-          <p:nvPr>
-            <p:ph idx="1"/>
-          </p:nvPr>
-        </p:nvPicPr>
-        <p:blipFill>
-          <a:blip r:embed="rId2">
-            <a:extLst>
-              <a:ext uri="{28A0092B-C50C-407E-A947-70E740481C1C}">
-                <a14:useLocalDpi xmlns:a14="http://schemas.microsoft.com/office/drawing/2010/main" val="0"/>
-              </a:ext>
-            </a:extLst>
-          </a:blip>
-          <a:stretch>
-            <a:fillRect/>
-          </a:stretch>
-        </p:blipFill>
-        <p:spPr>
-          <a:xfrm>
-            <a:off x="281004" y="1280159"/>
-            <a:ext cx="12200156" cy="4859383"/>
-          </a:xfrm>
-        </p:spPr>
-      </p:pic>
-      <p:sp>
-        <p:nvSpPr>
-          <p:cNvPr id="2" name="Title 1">
-            <a:extLst>
-              <a:ext uri="{FF2B5EF4-FFF2-40B4-BE49-F238E27FC236}">
-                <a16:creationId xmlns:a16="http://schemas.microsoft.com/office/drawing/2014/main" id="{CACC3D54-0243-4436-AEED-6A3150445D27}"/>
-              </a:ext>
-            </a:extLst>
-          </p:cNvPr>
-          <p:cNvSpPr>
-            <a:spLocks noGrp="1"/>
-          </p:cNvSpPr>
-          <p:nvPr>
-            <p:ph type="title"/>
-          </p:nvPr>
-        </p:nvSpPr>
-        <p:spPr/>
-        <p:txBody>
-          <a:bodyPr/>
-          <a:lstStyle/>
-          <a:p>
-            <a:r>
-              <a:rPr lang="nl-BE" dirty="0"/>
-              <a:t>8. </a:t>
-            </a:r>
-            <a:r>
-              <a:rPr lang="nl-BE" dirty="0" err="1"/>
-              <a:t>Add</a:t>
-            </a:r>
-            <a:r>
-              <a:rPr lang="nl-BE" dirty="0"/>
-              <a:t> </a:t>
-            </a:r>
-            <a:r>
-              <a:rPr lang="nl-BE" dirty="0" err="1"/>
-              <a:t>Row</a:t>
-            </a:r>
-            <a:endParaRPr lang="en-US" dirty="0"/>
-          </a:p>
-        </p:txBody>
-      </p:sp>
-    </p:spTree>
-    <p:extLst>
-      <p:ext uri="{BB962C8B-B14F-4D97-AF65-F5344CB8AC3E}">
-        <p14:creationId xmlns:p14="http://schemas.microsoft.com/office/powerpoint/2010/main" val="1982530797"/>
-      </p:ext>
-    </p:extLst>
-  </p:cSld>
-  <p:clrMapOvr>
-    <a:masterClrMapping/>
-  </p:clrMapOvr>
-</p:sld>
-</file>
-
-<file path=ppt/slides/slide29.xml><?xml version="1.0" encoding="utf-8"?>
-<p:sld xmlns:a="http://schemas.openxmlformats.org/drawingml/2006/main" xmlns:r="http://schemas.openxmlformats.org/officeDocument/2006/relationships" xmlns:p="http://schemas.openxmlformats.org/presentationml/2006/main">
-  <p:cSld>
-    <p:spTree>
-      <p:nvGrpSpPr>
-        <p:cNvPr id="1" name=""/>
-        <p:cNvGrpSpPr/>
-        <p:nvPr/>
-      </p:nvGrpSpPr>
-      <p:grpSpPr>
-        <a:xfrm>
-          <a:off x="0" y="0"/>
-          <a:ext cx="0" cy="0"/>
-          <a:chOff x="0" y="0"/>
-          <a:chExt cx="0" cy="0"/>
-        </a:xfrm>
-      </p:grpSpPr>
-      <p:pic>
-        <p:nvPicPr>
-          <p:cNvPr id="5" name="Content Placeholder 4">
-            <a:extLst>
-              <a:ext uri="{FF2B5EF4-FFF2-40B4-BE49-F238E27FC236}">
-                <a16:creationId xmlns:a16="http://schemas.microsoft.com/office/drawing/2014/main" id="{D2FA472B-DD2F-4B7B-A232-4B0922D167E0}"/>
-              </a:ext>
-            </a:extLst>
-          </p:cNvPr>
-          <p:cNvPicPr>
-            <a:picLocks noGrp="1" noChangeAspect="1"/>
-          </p:cNvPicPr>
-          <p:nvPr>
-            <p:ph idx="1"/>
-          </p:nvPr>
-        </p:nvPicPr>
-        <p:blipFill>
-          <a:blip r:embed="rId2">
-            <a:extLst>
-              <a:ext uri="{28A0092B-C50C-407E-A947-70E740481C1C}">
-                <a14:useLocalDpi xmlns:a14="http://schemas.microsoft.com/office/drawing/2010/main" val="0"/>
-              </a:ext>
-            </a:extLst>
-          </a:blip>
-          <a:stretch>
-            <a:fillRect/>
-          </a:stretch>
-        </p:blipFill>
-        <p:spPr>
-          <a:xfrm>
-            <a:off x="222785" y="1417637"/>
-            <a:ext cx="11776381" cy="4941874"/>
-          </a:xfrm>
-        </p:spPr>
-      </p:pic>
-      <p:sp>
-        <p:nvSpPr>
-          <p:cNvPr id="2" name="Title 1">
-            <a:extLst>
-              <a:ext uri="{FF2B5EF4-FFF2-40B4-BE49-F238E27FC236}">
-                <a16:creationId xmlns:a16="http://schemas.microsoft.com/office/drawing/2014/main" id="{8E4E2E44-B80C-4CC7-9DCE-96B5F636BE21}"/>
-              </a:ext>
-            </a:extLst>
-          </p:cNvPr>
-          <p:cNvSpPr>
-            <a:spLocks noGrp="1"/>
-          </p:cNvSpPr>
-          <p:nvPr>
-            <p:ph type="title"/>
-          </p:nvPr>
-        </p:nvSpPr>
-        <p:spPr/>
-        <p:txBody>
-          <a:bodyPr/>
-          <a:lstStyle/>
-          <a:p>
-            <a:r>
-              <a:rPr lang="nl-BE" dirty="0"/>
-              <a:t>9. </a:t>
-            </a:r>
-            <a:r>
-              <a:rPr lang="nl-BE" dirty="0" err="1"/>
-              <a:t>Edit</a:t>
-            </a:r>
-            <a:r>
-              <a:rPr lang="nl-BE" dirty="0"/>
-              <a:t> </a:t>
-            </a:r>
-            <a:r>
-              <a:rPr lang="nl-BE" dirty="0" err="1"/>
-              <a:t>Row</a:t>
-            </a:r>
-            <a:r>
-              <a:rPr lang="nl-BE" dirty="0"/>
-              <a:t> Value</a:t>
-            </a:r>
-            <a:endParaRPr lang="en-US" dirty="0"/>
-          </a:p>
-        </p:txBody>
-      </p:sp>
-    </p:spTree>
-    <p:extLst>
-      <p:ext uri="{BB962C8B-B14F-4D97-AF65-F5344CB8AC3E}">
-        <p14:creationId xmlns:p14="http://schemas.microsoft.com/office/powerpoint/2010/main" val="2449132390"/>
       </p:ext>
     </p:extLst>
   </p:cSld>
@@ -9058,6 +9245,478 @@
 </file>
 
 <file path=ppt/slides/slide30.xml><?xml version="1.0" encoding="utf-8"?>
+<p:sld xmlns:a="http://schemas.openxmlformats.org/drawingml/2006/main" xmlns:r="http://schemas.openxmlformats.org/officeDocument/2006/relationships" xmlns:p="http://schemas.openxmlformats.org/presentationml/2006/main">
+  <p:cSld>
+    <p:spTree>
+      <p:nvGrpSpPr>
+        <p:cNvPr id="1" name=""/>
+        <p:cNvGrpSpPr/>
+        <p:nvPr/>
+      </p:nvGrpSpPr>
+      <p:grpSpPr>
+        <a:xfrm>
+          <a:off x="0" y="0"/>
+          <a:ext cx="0" cy="0"/>
+          <a:chOff x="0" y="0"/>
+          <a:chExt cx="0" cy="0"/>
+        </a:xfrm>
+      </p:grpSpPr>
+      <p:sp>
+        <p:nvSpPr>
+          <p:cNvPr id="2" name="Title 1">
+            <a:extLst>
+              <a:ext uri="{FF2B5EF4-FFF2-40B4-BE49-F238E27FC236}">
+                <a16:creationId xmlns:a16="http://schemas.microsoft.com/office/drawing/2014/main" id="{01B95CCF-9AB0-4B00-AF83-34AF084B3137}"/>
+              </a:ext>
+            </a:extLst>
+          </p:cNvPr>
+          <p:cNvSpPr>
+            <a:spLocks noGrp="1"/>
+          </p:cNvSpPr>
+          <p:nvPr>
+            <p:ph type="title"/>
+          </p:nvPr>
+        </p:nvSpPr>
+        <p:spPr/>
+        <p:txBody>
+          <a:bodyPr/>
+          <a:lstStyle/>
+          <a:p>
+            <a:r>
+              <a:rPr lang="nl-BE" dirty="0"/>
+              <a:t>6. </a:t>
+            </a:r>
+            <a:r>
+              <a:rPr lang="nl-BE" dirty="0" err="1"/>
+              <a:t>Edit</a:t>
+            </a:r>
+            <a:r>
+              <a:rPr lang="nl-BE" dirty="0"/>
+              <a:t> Column </a:t>
+            </a:r>
+            <a:r>
+              <a:rPr lang="nl-BE" dirty="0" err="1"/>
+              <a:t>Characteristic</a:t>
+            </a:r>
+            <a:r>
+              <a:rPr lang="nl-BE" dirty="0"/>
+              <a:t> (c)</a:t>
+            </a:r>
+            <a:endParaRPr lang="en-US" dirty="0"/>
+          </a:p>
+        </p:txBody>
+      </p:sp>
+      <p:pic>
+        <p:nvPicPr>
+          <p:cNvPr id="5" name="Content Placeholder 4">
+            <a:extLst>
+              <a:ext uri="{FF2B5EF4-FFF2-40B4-BE49-F238E27FC236}">
+                <a16:creationId xmlns:a16="http://schemas.microsoft.com/office/drawing/2014/main" id="{6738299C-111A-4A2D-8F19-83CDE4499729}"/>
+              </a:ext>
+            </a:extLst>
+          </p:cNvPr>
+          <p:cNvPicPr>
+            <a:picLocks noGrp="1" noChangeAspect="1"/>
+          </p:cNvPicPr>
+          <p:nvPr>
+            <p:ph idx="1"/>
+          </p:nvPr>
+        </p:nvPicPr>
+        <p:blipFill>
+          <a:blip r:embed="rId2">
+            <a:extLst>
+              <a:ext uri="{28A0092B-C50C-407E-A947-70E740481C1C}">
+                <a14:useLocalDpi xmlns:a14="http://schemas.microsoft.com/office/drawing/2010/main" val="0"/>
+              </a:ext>
+            </a:extLst>
+          </a:blip>
+          <a:stretch>
+            <a:fillRect/>
+          </a:stretch>
+        </p:blipFill>
+        <p:spPr>
+          <a:xfrm>
+            <a:off x="391947" y="1737360"/>
+            <a:ext cx="11408105" cy="4381373"/>
+          </a:xfrm>
+        </p:spPr>
+      </p:pic>
+      <p:sp>
+        <p:nvSpPr>
+          <p:cNvPr id="6" name="Rectangle 5">
+            <a:extLst>
+              <a:ext uri="{FF2B5EF4-FFF2-40B4-BE49-F238E27FC236}">
+                <a16:creationId xmlns:a16="http://schemas.microsoft.com/office/drawing/2014/main" id="{716EDE25-B667-4BE5-B83B-F2DE57A67A04}"/>
+              </a:ext>
+            </a:extLst>
+          </p:cNvPr>
+          <p:cNvSpPr/>
+          <p:nvPr/>
+        </p:nvSpPr>
+        <p:spPr>
+          <a:xfrm>
+            <a:off x="8061649" y="1737360"/>
+            <a:ext cx="1735494" cy="1015171"/>
+          </a:xfrm>
+          <a:prstGeom prst="rect">
+            <a:avLst/>
+          </a:prstGeom>
+          <a:solidFill>
+            <a:schemeClr val="bg1"/>
+          </a:solidFill>
+          <a:ln>
+            <a:noFill/>
+          </a:ln>
+        </p:spPr>
+        <p:style>
+          <a:lnRef idx="2">
+            <a:schemeClr val="accent1">
+              <a:shade val="50000"/>
+            </a:schemeClr>
+          </a:lnRef>
+          <a:fillRef idx="1">
+            <a:schemeClr val="accent1"/>
+          </a:fillRef>
+          <a:effectRef idx="0">
+            <a:schemeClr val="accent1"/>
+          </a:effectRef>
+          <a:fontRef idx="minor">
+            <a:schemeClr val="lt1"/>
+          </a:fontRef>
+        </p:style>
+        <p:txBody>
+          <a:bodyPr rtlCol="0" anchor="ctr"/>
+          <a:lstStyle/>
+          <a:p>
+            <a:pPr algn="ctr"/>
+            <a:endParaRPr lang="en-US"/>
+          </a:p>
+        </p:txBody>
+      </p:sp>
+    </p:spTree>
+    <p:extLst>
+      <p:ext uri="{BB962C8B-B14F-4D97-AF65-F5344CB8AC3E}">
+        <p14:creationId xmlns:p14="http://schemas.microsoft.com/office/powerpoint/2010/main" val="4122151920"/>
+      </p:ext>
+    </p:extLst>
+  </p:cSld>
+  <p:clrMapOvr>
+    <a:masterClrMapping/>
+  </p:clrMapOvr>
+</p:sld>
+</file>
+
+<file path=ppt/slides/slide31.xml><?xml version="1.0" encoding="utf-8"?>
+<p:sld xmlns:a="http://schemas.openxmlformats.org/drawingml/2006/main" xmlns:r="http://schemas.openxmlformats.org/officeDocument/2006/relationships" xmlns:p="http://schemas.openxmlformats.org/presentationml/2006/main">
+  <p:cSld>
+    <p:spTree>
+      <p:nvGrpSpPr>
+        <p:cNvPr id="1" name=""/>
+        <p:cNvGrpSpPr/>
+        <p:nvPr/>
+      </p:nvGrpSpPr>
+      <p:grpSpPr>
+        <a:xfrm>
+          <a:off x="0" y="0"/>
+          <a:ext cx="0" cy="0"/>
+          <a:chOff x="0" y="0"/>
+          <a:chExt cx="0" cy="0"/>
+        </a:xfrm>
+      </p:grpSpPr>
+      <p:pic>
+        <p:nvPicPr>
+          <p:cNvPr id="5" name="Content Placeholder 4">
+            <a:extLst>
+              <a:ext uri="{FF2B5EF4-FFF2-40B4-BE49-F238E27FC236}">
+                <a16:creationId xmlns:a16="http://schemas.microsoft.com/office/drawing/2014/main" id="{700D8207-ADC9-4674-9222-568FED3BF933}"/>
+              </a:ext>
+            </a:extLst>
+          </p:cNvPr>
+          <p:cNvPicPr>
+            <a:picLocks noGrp="1" noChangeAspect="1"/>
+          </p:cNvPicPr>
+          <p:nvPr>
+            <p:ph idx="1"/>
+          </p:nvPr>
+        </p:nvPicPr>
+        <p:blipFill>
+          <a:blip r:embed="rId2">
+            <a:extLst>
+              <a:ext uri="{28A0092B-C50C-407E-A947-70E740481C1C}">
+                <a14:useLocalDpi xmlns:a14="http://schemas.microsoft.com/office/drawing/2010/main" val="0"/>
+              </a:ext>
+            </a:extLst>
+          </a:blip>
+          <a:stretch>
+            <a:fillRect/>
+          </a:stretch>
+        </p:blipFill>
+        <p:spPr>
+          <a:xfrm>
+            <a:off x="1818227" y="1221110"/>
+            <a:ext cx="9337453" cy="5151698"/>
+          </a:xfrm>
+        </p:spPr>
+      </p:pic>
+      <p:sp>
+        <p:nvSpPr>
+          <p:cNvPr id="2" name="Title 1">
+            <a:extLst>
+              <a:ext uri="{FF2B5EF4-FFF2-40B4-BE49-F238E27FC236}">
+                <a16:creationId xmlns:a16="http://schemas.microsoft.com/office/drawing/2014/main" id="{B7363E8D-7849-45BA-B36F-F33F3F03E579}"/>
+              </a:ext>
+            </a:extLst>
+          </p:cNvPr>
+          <p:cNvSpPr>
+            <a:spLocks noGrp="1"/>
+          </p:cNvSpPr>
+          <p:nvPr>
+            <p:ph type="title"/>
+          </p:nvPr>
+        </p:nvSpPr>
+        <p:spPr/>
+        <p:txBody>
+          <a:bodyPr/>
+          <a:lstStyle/>
+          <a:p>
+            <a:r>
+              <a:rPr lang="nl-BE" dirty="0"/>
+              <a:t>7. Delete Column</a:t>
+            </a:r>
+            <a:endParaRPr lang="en-US" dirty="0"/>
+          </a:p>
+        </p:txBody>
+      </p:sp>
+    </p:spTree>
+    <p:extLst>
+      <p:ext uri="{BB962C8B-B14F-4D97-AF65-F5344CB8AC3E}">
+        <p14:creationId xmlns:p14="http://schemas.microsoft.com/office/powerpoint/2010/main" val="1061075301"/>
+      </p:ext>
+    </p:extLst>
+  </p:cSld>
+  <p:clrMapOvr>
+    <a:masterClrMapping/>
+  </p:clrMapOvr>
+</p:sld>
+</file>
+
+<file path=ppt/slides/slide32.xml><?xml version="1.0" encoding="utf-8"?>
+<p:sld xmlns:a="http://schemas.openxmlformats.org/drawingml/2006/main" xmlns:r="http://schemas.openxmlformats.org/officeDocument/2006/relationships" xmlns:p="http://schemas.openxmlformats.org/presentationml/2006/main">
+  <p:cSld>
+    <p:spTree>
+      <p:nvGrpSpPr>
+        <p:cNvPr id="1" name=""/>
+        <p:cNvGrpSpPr/>
+        <p:nvPr/>
+      </p:nvGrpSpPr>
+      <p:grpSpPr>
+        <a:xfrm>
+          <a:off x="0" y="0"/>
+          <a:ext cx="0" cy="0"/>
+          <a:chOff x="0" y="0"/>
+          <a:chExt cx="0" cy="0"/>
+        </a:xfrm>
+      </p:grpSpPr>
+      <p:pic>
+        <p:nvPicPr>
+          <p:cNvPr id="5" name="Content Placeholder 4">
+            <a:extLst>
+              <a:ext uri="{FF2B5EF4-FFF2-40B4-BE49-F238E27FC236}">
+                <a16:creationId xmlns:a16="http://schemas.microsoft.com/office/drawing/2014/main" id="{858CECC6-FF97-4BE0-900D-82973106F233}"/>
+              </a:ext>
+            </a:extLst>
+          </p:cNvPr>
+          <p:cNvPicPr>
+            <a:picLocks noGrp="1" noChangeAspect="1"/>
+          </p:cNvPicPr>
+          <p:nvPr>
+            <p:ph idx="1"/>
+          </p:nvPr>
+        </p:nvPicPr>
+        <p:blipFill>
+          <a:blip r:embed="rId2">
+            <a:extLst>
+              <a:ext uri="{28A0092B-C50C-407E-A947-70E740481C1C}">
+                <a14:useLocalDpi xmlns:a14="http://schemas.microsoft.com/office/drawing/2010/main" val="0"/>
+              </a:ext>
+            </a:extLst>
+          </a:blip>
+          <a:stretch>
+            <a:fillRect/>
+          </a:stretch>
+        </p:blipFill>
+        <p:spPr>
+          <a:xfrm>
+            <a:off x="281004" y="1280159"/>
+            <a:ext cx="12200156" cy="4859383"/>
+          </a:xfrm>
+        </p:spPr>
+      </p:pic>
+      <p:sp>
+        <p:nvSpPr>
+          <p:cNvPr id="2" name="Title 1">
+            <a:extLst>
+              <a:ext uri="{FF2B5EF4-FFF2-40B4-BE49-F238E27FC236}">
+                <a16:creationId xmlns:a16="http://schemas.microsoft.com/office/drawing/2014/main" id="{CACC3D54-0243-4436-AEED-6A3150445D27}"/>
+              </a:ext>
+            </a:extLst>
+          </p:cNvPr>
+          <p:cNvSpPr>
+            <a:spLocks noGrp="1"/>
+          </p:cNvSpPr>
+          <p:nvPr>
+            <p:ph type="title"/>
+          </p:nvPr>
+        </p:nvSpPr>
+        <p:spPr/>
+        <p:txBody>
+          <a:bodyPr/>
+          <a:lstStyle/>
+          <a:p>
+            <a:r>
+              <a:rPr lang="nl-BE" dirty="0"/>
+              <a:t>8. </a:t>
+            </a:r>
+            <a:r>
+              <a:rPr lang="nl-BE" dirty="0" err="1"/>
+              <a:t>Add</a:t>
+            </a:r>
+            <a:r>
+              <a:rPr lang="nl-BE" dirty="0"/>
+              <a:t> </a:t>
+            </a:r>
+            <a:r>
+              <a:rPr lang="nl-BE" dirty="0" err="1"/>
+              <a:t>Row</a:t>
+            </a:r>
+            <a:endParaRPr lang="en-US" dirty="0"/>
+          </a:p>
+        </p:txBody>
+      </p:sp>
+    </p:spTree>
+    <p:extLst>
+      <p:ext uri="{BB962C8B-B14F-4D97-AF65-F5344CB8AC3E}">
+        <p14:creationId xmlns:p14="http://schemas.microsoft.com/office/powerpoint/2010/main" val="1982530797"/>
+      </p:ext>
+    </p:extLst>
+  </p:cSld>
+  <p:clrMapOvr>
+    <a:masterClrMapping/>
+  </p:clrMapOvr>
+</p:sld>
+</file>
+
+<file path=ppt/slides/slide33.xml><?xml version="1.0" encoding="utf-8"?>
+<p:sld xmlns:a="http://schemas.openxmlformats.org/drawingml/2006/main" xmlns:r="http://schemas.openxmlformats.org/officeDocument/2006/relationships" xmlns:p="http://schemas.openxmlformats.org/presentationml/2006/main">
+  <p:cSld>
+    <p:spTree>
+      <p:nvGrpSpPr>
+        <p:cNvPr id="1" name=""/>
+        <p:cNvGrpSpPr/>
+        <p:nvPr/>
+      </p:nvGrpSpPr>
+      <p:grpSpPr>
+        <a:xfrm>
+          <a:off x="0" y="0"/>
+          <a:ext cx="0" cy="0"/>
+          <a:chOff x="0" y="0"/>
+          <a:chExt cx="0" cy="0"/>
+        </a:xfrm>
+      </p:grpSpPr>
+      <p:pic>
+        <p:nvPicPr>
+          <p:cNvPr id="5" name="Content Placeholder 4">
+            <a:extLst>
+              <a:ext uri="{FF2B5EF4-FFF2-40B4-BE49-F238E27FC236}">
+                <a16:creationId xmlns:a16="http://schemas.microsoft.com/office/drawing/2014/main" id="{D2FA472B-DD2F-4B7B-A232-4B0922D167E0}"/>
+              </a:ext>
+            </a:extLst>
+          </p:cNvPr>
+          <p:cNvPicPr>
+            <a:picLocks noGrp="1" noChangeAspect="1"/>
+          </p:cNvPicPr>
+          <p:nvPr>
+            <p:ph idx="1"/>
+          </p:nvPr>
+        </p:nvPicPr>
+        <p:blipFill>
+          <a:blip r:embed="rId2">
+            <a:extLst>
+              <a:ext uri="{28A0092B-C50C-407E-A947-70E740481C1C}">
+                <a14:useLocalDpi xmlns:a14="http://schemas.microsoft.com/office/drawing/2010/main" val="0"/>
+              </a:ext>
+            </a:extLst>
+          </a:blip>
+          <a:stretch>
+            <a:fillRect/>
+          </a:stretch>
+        </p:blipFill>
+        <p:spPr>
+          <a:xfrm>
+            <a:off x="222785" y="1417637"/>
+            <a:ext cx="11776381" cy="4941874"/>
+          </a:xfrm>
+        </p:spPr>
+      </p:pic>
+      <p:sp>
+        <p:nvSpPr>
+          <p:cNvPr id="2" name="Title 1">
+            <a:extLst>
+              <a:ext uri="{FF2B5EF4-FFF2-40B4-BE49-F238E27FC236}">
+                <a16:creationId xmlns:a16="http://schemas.microsoft.com/office/drawing/2014/main" id="{8E4E2E44-B80C-4CC7-9DCE-96B5F636BE21}"/>
+              </a:ext>
+            </a:extLst>
+          </p:cNvPr>
+          <p:cNvSpPr>
+            <a:spLocks noGrp="1"/>
+          </p:cNvSpPr>
+          <p:nvPr>
+            <p:ph type="title"/>
+          </p:nvPr>
+        </p:nvSpPr>
+        <p:spPr/>
+        <p:txBody>
+          <a:bodyPr/>
+          <a:lstStyle/>
+          <a:p>
+            <a:r>
+              <a:rPr lang="nl-BE" dirty="0"/>
+              <a:t>9. </a:t>
+            </a:r>
+            <a:r>
+              <a:rPr lang="nl-BE" dirty="0" err="1"/>
+              <a:t>Edit</a:t>
+            </a:r>
+            <a:r>
+              <a:rPr lang="nl-BE" dirty="0"/>
+              <a:t> </a:t>
+            </a:r>
+            <a:r>
+              <a:rPr lang="nl-BE" dirty="0" err="1"/>
+              <a:t>Row</a:t>
+            </a:r>
+            <a:r>
+              <a:rPr lang="nl-BE" dirty="0"/>
+              <a:t> Value</a:t>
+            </a:r>
+            <a:endParaRPr lang="en-US" dirty="0"/>
+          </a:p>
+        </p:txBody>
+      </p:sp>
+    </p:spTree>
+    <p:extLst>
+      <p:ext uri="{BB962C8B-B14F-4D97-AF65-F5344CB8AC3E}">
+        <p14:creationId xmlns:p14="http://schemas.microsoft.com/office/powerpoint/2010/main" val="2449132390"/>
+      </p:ext>
+    </p:extLst>
+  </p:cSld>
+  <p:clrMapOvr>
+    <a:masterClrMapping/>
+  </p:clrMapOvr>
+</p:sld>
+</file>
+
+<file path=ppt/slides/slide34.xml><?xml version="1.0" encoding="utf-8"?>
 <p:sld xmlns:a="http://schemas.openxmlformats.org/drawingml/2006/main" xmlns:r="http://schemas.openxmlformats.org/officeDocument/2006/relationships" xmlns:p="http://schemas.openxmlformats.org/presentationml/2006/main">
   <p:cSld>
     <p:spTree>

</xml_diff>